<commit_message>
Recreate PPT to match HTML content exactly
- Fixed all content to match respring-business-plan.html
- Added proper cover slide with small subtitle
- All 17 slides with correct content and formatting
- All corrections included: BEP 1,400만원, 대표 무급, 원가 165M, 25톤, etc.
</commit_message>
<xml_diff>
--- a/ReSpring_Business_Plan.pptx
+++ b/ReSpring_Business_Plan.pptx
@@ -3120,8 +3120,8 @@
         </p:nvSpPr>
         <p:spPr>
           <a:xfrm>
-            <a:off x="914400" y="2286000"/>
-            <a:ext cx="7315200" cy="1371600"/>
+            <a:off x="914400" y="1371600"/>
+            <a:ext cx="7315200" cy="365760"/>
           </a:xfrm>
           <a:prstGeom prst="rect">
             <a:avLst/>
@@ -3135,7 +3135,42 @@
           <a:lstStyle/>
           <a:p>
             <a:pPr algn="l">
-              <a:defRPr sz="6000" b="1">
+              <a:defRPr sz="1600" b="1">
+                <a:solidFill>
+                  <a:srgbClr val="10B981"/>
+                </a:solidFill>
+              </a:defRPr>
+            </a:pPr>
+            <a:r>
+              <a:t>비영리조직 사업(창업)계획서</a:t>
+            </a:r>
+          </a:p>
+        </p:txBody>
+      </p:sp>
+      <p:sp>
+        <p:nvSpPr>
+          <p:cNvPr id="3" name="TextBox 2"/>
+          <p:cNvSpPr txBox="1"/>
+          <p:nvPr/>
+        </p:nvSpPr>
+        <p:spPr>
+          <a:xfrm>
+            <a:off x="914400" y="2011680"/>
+            <a:ext cx="7315200" cy="1097280"/>
+          </a:xfrm>
+          <a:prstGeom prst="rect">
+            <a:avLst/>
+          </a:prstGeom>
+          <a:noFill/>
+        </p:spPr>
+        <p:txBody>
+          <a:bodyPr wrap="none">
+            <a:spAutoFit/>
+          </a:bodyPr>
+          <a:lstStyle/>
+          <a:p>
+            <a:pPr algn="l">
+              <a:defRPr sz="7000" b="1">
                 <a:solidFill>
                   <a:srgbClr val="FFFFFF"/>
                 </a:solidFill>
@@ -3149,14 +3184,14 @@
       </p:sp>
       <p:sp>
         <p:nvSpPr>
-          <p:cNvPr id="3" name="TextBox 2"/>
+          <p:cNvPr id="4" name="TextBox 3"/>
           <p:cNvSpPr txBox="1"/>
           <p:nvPr/>
         </p:nvSpPr>
         <p:spPr>
           <a:xfrm>
-            <a:off x="914400" y="3657600"/>
-            <a:ext cx="7315200" cy="914400"/>
+            <a:off x="914400" y="3200400"/>
+            <a:ext cx="7315200" cy="731520"/>
           </a:xfrm>
           <a:prstGeom prst="rect">
             <a:avLst/>
@@ -3184,14 +3219,14 @@
       </p:sp>
       <p:sp>
         <p:nvSpPr>
-          <p:cNvPr id="4" name="TextBox 3"/>
+          <p:cNvPr id="5" name="TextBox 4"/>
           <p:cNvSpPr txBox="1"/>
           <p:nvPr/>
         </p:nvSpPr>
         <p:spPr>
           <a:xfrm>
-            <a:off x="914400" y="5486400"/>
-            <a:ext cx="7315200" cy="914400"/>
+            <a:off x="914400" y="5303520"/>
+            <a:ext cx="5486400" cy="914400"/>
           </a:xfrm>
           <a:prstGeom prst="rect">
             <a:avLst/>
@@ -3216,6 +3251,13 @@
             </a:r>
           </a:p>
           <a:p>
+            <a:pPr algn="l">
+              <a:defRPr sz="1400">
+                <a:solidFill>
+                  <a:srgbClr val="94A3B8"/>
+                </a:solidFill>
+              </a:defRPr>
+            </a:pPr>
             <a:r>
               <a:t>제출자: 사회복지학과 202531606 민소은</a:t>
             </a:r>
@@ -3248,8 +3290,8 @@
         </p:nvSpPr>
         <p:spPr>
           <a:xfrm>
-            <a:off x="457200" y="274320"/>
-            <a:ext cx="8229600" cy="548640"/>
+            <a:off x="457200" y="365760"/>
+            <a:ext cx="8229600" cy="457200"/>
           </a:xfrm>
           <a:prstGeom prst="rect">
             <a:avLst/>
@@ -3257,36 +3299,36 @@
           <a:noFill/>
         </p:spPr>
         <p:txBody>
-          <a:bodyPr wrap="none">
+          <a:bodyPr wrap="square">
             <a:spAutoFit/>
           </a:bodyPr>
           <a:lstStyle/>
           <a:p>
             <a:pPr>
-              <a:defRPr sz="2800" b="1">
+              <a:defRPr sz="2600" b="1">
                 <a:solidFill>
                   <a:srgbClr val="0F172A"/>
                 </a:solidFill>
               </a:defRPr>
             </a:pPr>
             <a:r>
-              <a:t>③ 사업계획: 정부 제도 활용 전략</a:t>
-            </a:r>
-          </a:p>
-        </p:txBody>
-      </p:sp>
-      <p:sp>
-        <p:nvSpPr>
-          <p:cNvPr id="3" name="Rectangle 2"/>
-          <p:cNvSpPr/>
+              <a:t>③ 사업계획: 정부 제도 활용 전략 (필수 기입)</a:t>
+            </a:r>
+          </a:p>
+        </p:txBody>
+      </p:sp>
+      <p:cxnSp>
+        <p:nvCxnSpPr>
+          <p:cNvPr id="3" name="Connector 2"/>
+          <p:cNvCxnSpPr/>
           <p:nvPr/>
-        </p:nvSpPr>
-        <p:spPr>
-          <a:xfrm>
-            <a:off x="457200" y="868680"/>
+        </p:nvCxnSpPr>
+        <p:spPr>
+          <a:xfrm>
+            <a:off x="457200" y="914400"/>
             <a:ext cx="8229600" cy="0"/>
           </a:xfrm>
-          <a:prstGeom prst="rect">
+          <a:prstGeom prst="line">
             <a:avLst/>
           </a:prstGeom>
           <a:ln w="50800">
@@ -3296,27 +3338,20 @@
           </a:ln>
         </p:spPr>
         <p:style>
-          <a:lnRef idx="1">
+          <a:lnRef idx="2">
             <a:schemeClr val="accent1"/>
           </a:lnRef>
-          <a:fillRef idx="3">
+          <a:fillRef idx="0">
             <a:schemeClr val="accent1"/>
           </a:fillRef>
-          <a:effectRef idx="2">
+          <a:effectRef idx="1">
             <a:schemeClr val="accent1"/>
           </a:effectRef>
           <a:fontRef idx="minor">
-            <a:schemeClr val="lt1"/>
+            <a:schemeClr val="tx1"/>
           </a:fontRef>
         </p:style>
-        <p:txBody>
-          <a:bodyPr rtlCol="0" anchor="ctr"/>
-          <a:lstStyle/>
-          <a:p>
-            <a:pPr algn="ctr"/>
-          </a:p>
-        </p:txBody>
-      </p:sp>
+      </p:cxnSp>
       <p:sp>
         <p:nvSpPr>
           <p:cNvPr id="4" name="TextBox 3"/>
@@ -3326,7 +3361,7 @@
         <p:spPr>
           <a:xfrm>
             <a:off x="731520" y="2011680"/>
-            <a:ext cx="2560320" cy="2743200"/>
+            <a:ext cx="2468880" cy="3200400"/>
           </a:xfrm>
           <a:prstGeom prst="rect">
             <a:avLst/>
@@ -3340,7 +3375,7 @@
           <a:lstStyle/>
           <a:p>
             <a:pPr>
-              <a:defRPr sz="1400" b="1">
+              <a:defRPr sz="1200" b="1">
                 <a:solidFill>
                   <a:srgbClr val="3B82F6"/>
                 </a:solidFill>
@@ -3350,30 +3385,22 @@
               <a:t>1. 진입기</a:t>
             </a:r>
           </a:p>
-          <a:p>
-            <a:pPr>
-              <a:defRPr sz="1200"/>
-            </a:pPr>
-          </a:p>
-          <a:p>
-            <a:pPr>
-              <a:defRPr sz="1200"/>
+          <a:p/>
+          <a:p>
+            <a:pPr>
+              <a:defRPr sz="1400" b="1"/>
             </a:pPr>
             <a:r>
               <a:t>사회적기업가 육성사업</a:t>
             </a:r>
           </a:p>
-          <a:p>
-            <a:pPr>
-              <a:defRPr sz="1200"/>
-            </a:pPr>
-          </a:p>
-          <a:p>
-            <a:pPr>
-              <a:defRPr sz="1200"/>
-            </a:pPr>
-            <a:r>
-              <a:t>창업 초기 자금 3,000만원 확보하여 핵심 설비(사출기) 구입</a:t>
+          <a:p/>
+          <a:p>
+            <a:pPr>
+              <a:defRPr sz="1100"/>
+            </a:pPr>
+            <a:r>
+              <a:t>창업 초기 자금 3,000만원 확보하여 핵심 설비(사출기) 구입 비용으로 사용.</a:t>
             </a:r>
           </a:p>
         </p:txBody>
@@ -3387,7 +3414,7 @@
         <p:spPr>
           <a:xfrm>
             <a:off x="3474720" y="2011680"/>
-            <a:ext cx="2560320" cy="2743200"/>
+            <a:ext cx="2468880" cy="3200400"/>
           </a:xfrm>
           <a:prstGeom prst="rect">
             <a:avLst/>
@@ -3401,7 +3428,7 @@
           <a:lstStyle/>
           <a:p>
             <a:pPr>
-              <a:defRPr sz="1400" b="1">
+              <a:defRPr sz="1200" b="1">
                 <a:solidFill>
                   <a:srgbClr val="3B82F6"/>
                 </a:solidFill>
@@ -3411,30 +3438,22 @@
               <a:t>2. 성장기</a:t>
             </a:r>
           </a:p>
-          <a:p>
-            <a:pPr>
-              <a:defRPr sz="1200"/>
-            </a:pPr>
-          </a:p>
-          <a:p>
-            <a:pPr>
-              <a:defRPr sz="1200"/>
+          <a:p/>
+          <a:p>
+            <a:pPr>
+              <a:defRPr sz="1400" b="1"/>
             </a:pPr>
             <a:r>
               <a:t>일자리창출사업 (예비)</a:t>
             </a:r>
           </a:p>
-          <a:p>
-            <a:pPr>
-              <a:defRPr sz="1200"/>
-            </a:pPr>
-          </a:p>
-          <a:p>
-            <a:pPr>
-              <a:defRPr sz="1200"/>
-            </a:pPr>
-            <a:r>
-              <a:t>예비사회적기업 지정 후, 취약계층 신규 채용 인건비의 50~70% 지원</a:t>
+          <a:p/>
+          <a:p>
+            <a:pPr>
+              <a:defRPr sz="1100"/>
+            </a:pPr>
+            <a:r>
+              <a:t>예비사회적기업 지정 후, 취약계층 신규 채용 인건비의 50~70%를 지원받아 고정비 절감.</a:t>
             </a:r>
           </a:p>
         </p:txBody>
@@ -3448,7 +3467,7 @@
         <p:spPr>
           <a:xfrm>
             <a:off x="6217920" y="2011680"/>
-            <a:ext cx="2560320" cy="2743200"/>
+            <a:ext cx="2468880" cy="3200400"/>
           </a:xfrm>
           <a:prstGeom prst="rect">
             <a:avLst/>
@@ -3462,7 +3481,7 @@
           <a:lstStyle/>
           <a:p>
             <a:pPr>
-              <a:defRPr sz="1400" b="1">
+              <a:defRPr sz="1200" b="1">
                 <a:solidFill>
                   <a:srgbClr val="3B82F6"/>
                 </a:solidFill>
@@ -3472,30 +3491,22 @@
               <a:t>3. 도약기</a:t>
             </a:r>
           </a:p>
-          <a:p>
-            <a:pPr>
-              <a:defRPr sz="1200"/>
-            </a:pPr>
-          </a:p>
-          <a:p>
-            <a:pPr>
-              <a:defRPr sz="1200"/>
+          <a:p/>
+          <a:p>
+            <a:pPr>
+              <a:defRPr sz="1400" b="1"/>
             </a:pPr>
             <a:r>
               <a:t>장애인 표준사업장 지원</a:t>
             </a:r>
           </a:p>
-          <a:p>
-            <a:pPr>
-              <a:defRPr sz="1200"/>
-            </a:pPr>
-          </a:p>
-          <a:p>
-            <a:pPr>
-              <a:defRPr sz="1200"/>
-            </a:pPr>
-            <a:r>
-              <a:t>한국장애인고용공단 시설 무상지원금으로 작업장 환경 개선</a:t>
+          <a:p/>
+          <a:p>
+            <a:pPr>
+              <a:defRPr sz="1100"/>
+            </a:pPr>
+            <a:r>
+              <a:t>한국장애인고용공단 시설 무상지원금을 활용하여 작업장 환경 개선.</a:t>
             </a:r>
           </a:p>
         </p:txBody>
@@ -3526,8 +3537,8 @@
         </p:nvSpPr>
         <p:spPr>
           <a:xfrm>
-            <a:off x="457200" y="274320"/>
-            <a:ext cx="8229600" cy="548640"/>
+            <a:off x="457200" y="365760"/>
+            <a:ext cx="8229600" cy="457200"/>
           </a:xfrm>
           <a:prstGeom prst="rect">
             <a:avLst/>
@@ -3535,13 +3546,13 @@
           <a:noFill/>
         </p:spPr>
         <p:txBody>
-          <a:bodyPr wrap="none">
+          <a:bodyPr wrap="square">
             <a:spAutoFit/>
           </a:bodyPr>
           <a:lstStyle/>
           <a:p>
             <a:pPr>
-              <a:defRPr sz="2800" b="1">
+              <a:defRPr sz="2600" b="1">
                 <a:solidFill>
                   <a:srgbClr val="0F172A"/>
                 </a:solidFill>
@@ -3553,18 +3564,18 @@
           </a:p>
         </p:txBody>
       </p:sp>
-      <p:sp>
-        <p:nvSpPr>
-          <p:cNvPr id="3" name="Rectangle 2"/>
-          <p:cNvSpPr/>
+      <p:cxnSp>
+        <p:nvCxnSpPr>
+          <p:cNvPr id="3" name="Connector 2"/>
+          <p:cNvCxnSpPr/>
           <p:nvPr/>
-        </p:nvSpPr>
-        <p:spPr>
-          <a:xfrm>
-            <a:off x="457200" y="868680"/>
+        </p:nvCxnSpPr>
+        <p:spPr>
+          <a:xfrm>
+            <a:off x="457200" y="914400"/>
             <a:ext cx="8229600" cy="0"/>
           </a:xfrm>
-          <a:prstGeom prst="rect">
+          <a:prstGeom prst="line">
             <a:avLst/>
           </a:prstGeom>
           <a:ln w="50800">
@@ -3574,27 +3585,20 @@
           </a:ln>
         </p:spPr>
         <p:style>
-          <a:lnRef idx="1">
+          <a:lnRef idx="2">
             <a:schemeClr val="accent1"/>
           </a:lnRef>
-          <a:fillRef idx="3">
+          <a:fillRef idx="0">
             <a:schemeClr val="accent1"/>
           </a:fillRef>
-          <a:effectRef idx="2">
+          <a:effectRef idx="1">
             <a:schemeClr val="accent1"/>
           </a:effectRef>
           <a:fontRef idx="minor">
-            <a:schemeClr val="lt1"/>
+            <a:schemeClr val="tx1"/>
           </a:fontRef>
         </p:style>
-        <p:txBody>
-          <a:bodyPr rtlCol="0" anchor="ctr"/>
-          <a:lstStyle/>
-          <a:p>
-            <a:pPr algn="ctr"/>
-          </a:p>
-        </p:txBody>
-      </p:sp>
+      </p:cxnSp>
       <p:sp>
         <p:nvSpPr>
           <p:cNvPr id="4" name="TextBox 3"/>
@@ -3604,7 +3608,7 @@
         <p:spPr>
           <a:xfrm>
             <a:off x="1371600" y="1828800"/>
-            <a:ext cx="3200400" cy="2743200"/>
+            <a:ext cx="3200400" cy="3200400"/>
           </a:xfrm>
           <a:prstGeom prst="rect">
             <a:avLst/>
@@ -3618,52 +3622,40 @@
           <a:lstStyle/>
           <a:p>
             <a:pPr>
-              <a:defRPr sz="1800" b="1"/>
+              <a:defRPr sz="1600" b="1"/>
             </a:pPr>
             <a:r>
               <a:t>총 소요 예산: 1억 원</a:t>
             </a:r>
           </a:p>
-          <a:p>
-            <a:pPr>
-              <a:defRPr sz="1400"/>
-            </a:pPr>
-          </a:p>
-          <a:p>
-            <a:pPr>
-              <a:defRPr sz="1400"/>
+          <a:p/>
+          <a:p>
+            <a:pPr>
+              <a:defRPr sz="1300"/>
             </a:pPr>
             <a:r>
               <a:t>• 시설자금 (6,000만원):</a:t>
             </a:r>
-          </a:p>
-          <a:p>
-            <a:pPr>
-              <a:defRPr sz="1400"/>
-            </a:pPr>
-            <a:r>
-              <a:t>  사출기, 분쇄기, 금형 제작비, 공장 보증금</a:t>
-            </a:r>
-          </a:p>
-          <a:p>
-            <a:pPr>
-              <a:defRPr sz="1400"/>
-            </a:pPr>
-          </a:p>
-          <a:p>
-            <a:pPr>
-              <a:defRPr sz="1400"/>
+            <a:br/>
+            <a:r>
+              <a:t>  사출기, 분쇄기, 금형 제작비, 공장 보증금.</a:t>
+            </a:r>
+          </a:p>
+          <a:p>
+            <a:pPr>
+              <a:defRPr sz="1300"/>
+            </a:pPr>
+          </a:p>
+          <a:p>
+            <a:pPr>
+              <a:defRPr sz="1300"/>
             </a:pPr>
             <a:r>
               <a:t>• 운전자금 (4,000만원):</a:t>
             </a:r>
-          </a:p>
-          <a:p>
-            <a:pPr>
-              <a:defRPr sz="1400"/>
-            </a:pPr>
-            <a:r>
-              <a:t>  초기 6개월 인건비, 재료비, 시제품 홍보비</a:t>
+            <a:br/>
+            <a:r>
+              <a:t>  초기 6개월 인건비, 재료비, 시제품 홍보비.</a:t>
             </a:r>
           </a:p>
         </p:txBody>
@@ -3677,7 +3669,7 @@
         <p:spPr>
           <a:xfrm>
             <a:off x="5029200" y="1828800"/>
-            <a:ext cx="3200400" cy="2743200"/>
+            <a:ext cx="3200400" cy="3200400"/>
           </a:xfrm>
           <a:prstGeom prst="rect">
             <a:avLst/>
@@ -3691,52 +3683,40 @@
           <a:lstStyle/>
           <a:p>
             <a:pPr>
-              <a:defRPr sz="1800" b="1"/>
+              <a:defRPr sz="1600" b="1"/>
             </a:pPr>
             <a:r>
               <a:t>생산 설비 특징</a:t>
             </a:r>
           </a:p>
-          <a:p>
-            <a:pPr>
-              <a:defRPr sz="1400"/>
-            </a:pPr>
-          </a:p>
-          <a:p>
-            <a:pPr>
-              <a:defRPr sz="1400"/>
+          <a:p/>
+          <a:p>
+            <a:pPr>
+              <a:defRPr sz="1300"/>
             </a:pPr>
             <a:r>
               <a:t>• 소형 사출기:</a:t>
             </a:r>
-          </a:p>
-          <a:p>
-            <a:pPr>
-              <a:defRPr sz="1400"/>
-            </a:pPr>
-            <a:r>
-              <a:t>  다품종 소량 생산 용이, 장애인 접근성 고려</a:t>
-            </a:r>
-          </a:p>
-          <a:p>
-            <a:pPr>
-              <a:defRPr sz="1400"/>
-            </a:pPr>
-          </a:p>
-          <a:p>
-            <a:pPr>
-              <a:defRPr sz="1400"/>
+            <a:br/>
+            <a:r>
+              <a:t>  다품종 소량 생산 용이, 장애인 접근성 고려.</a:t>
+            </a:r>
+          </a:p>
+          <a:p>
+            <a:pPr>
+              <a:defRPr sz="1300"/>
+            </a:pPr>
+          </a:p>
+          <a:p>
+            <a:pPr>
+              <a:defRPr sz="1300"/>
             </a:pPr>
             <a:r>
               <a:t>• 저소음 분쇄기:</a:t>
             </a:r>
-          </a:p>
-          <a:p>
-            <a:pPr>
-              <a:defRPr sz="1400"/>
-            </a:pPr>
-            <a:r>
-              <a:t>  작업자 청력 보호를 위한 방음 박스 및 안전 센서</a:t>
+            <a:br/>
+            <a:r>
+              <a:t>  작업자 청력 보호를 위한 방음 박스 및 안전 센서 부착.</a:t>
             </a:r>
           </a:p>
         </p:txBody>
@@ -3767,8 +3747,8 @@
         </p:nvSpPr>
         <p:spPr>
           <a:xfrm>
-            <a:off x="457200" y="274320"/>
-            <a:ext cx="8229600" cy="548640"/>
+            <a:off x="457200" y="365760"/>
+            <a:ext cx="8229600" cy="457200"/>
           </a:xfrm>
           <a:prstGeom prst="rect">
             <a:avLst/>
@@ -3776,13 +3756,13 @@
           <a:noFill/>
         </p:spPr>
         <p:txBody>
-          <a:bodyPr wrap="none">
+          <a:bodyPr wrap="square">
             <a:spAutoFit/>
           </a:bodyPr>
           <a:lstStyle/>
           <a:p>
             <a:pPr>
-              <a:defRPr sz="2800" b="1">
+              <a:defRPr sz="2600" b="1">
                 <a:solidFill>
                   <a:srgbClr val="0F172A"/>
                 </a:solidFill>
@@ -3794,18 +3774,18 @@
           </a:p>
         </p:txBody>
       </p:sp>
-      <p:sp>
-        <p:nvSpPr>
-          <p:cNvPr id="3" name="Rectangle 2"/>
-          <p:cNvSpPr/>
+      <p:cxnSp>
+        <p:nvCxnSpPr>
+          <p:cNvPr id="3" name="Connector 2"/>
+          <p:cNvCxnSpPr/>
           <p:nvPr/>
-        </p:nvSpPr>
-        <p:spPr>
-          <a:xfrm>
-            <a:off x="457200" y="868680"/>
+        </p:nvCxnSpPr>
+        <p:spPr>
+          <a:xfrm>
+            <a:off x="457200" y="914400"/>
             <a:ext cx="8229600" cy="0"/>
           </a:xfrm>
-          <a:prstGeom prst="rect">
+          <a:prstGeom prst="line">
             <a:avLst/>
           </a:prstGeom>
           <a:ln w="50800">
@@ -3815,27 +3795,20 @@
           </a:ln>
         </p:spPr>
         <p:style>
-          <a:lnRef idx="1">
+          <a:lnRef idx="2">
             <a:schemeClr val="accent1"/>
           </a:lnRef>
-          <a:fillRef idx="3">
+          <a:fillRef idx="0">
             <a:schemeClr val="accent1"/>
           </a:fillRef>
-          <a:effectRef idx="2">
+          <a:effectRef idx="1">
             <a:schemeClr val="accent1"/>
           </a:effectRef>
           <a:fontRef idx="minor">
-            <a:schemeClr val="lt1"/>
+            <a:schemeClr val="tx1"/>
           </a:fontRef>
         </p:style>
-        <p:txBody>
-          <a:bodyPr rtlCol="0" anchor="ctr"/>
-          <a:lstStyle/>
-          <a:p>
-            <a:pPr algn="ctr"/>
-          </a:p>
-        </p:txBody>
-      </p:sp>
+      </p:cxnSp>
       <p:sp>
         <p:nvSpPr>
           <p:cNvPr id="4" name="TextBox 3"/>
@@ -3845,7 +3818,7 @@
         <p:spPr>
           <a:xfrm>
             <a:off x="1828800" y="1371600"/>
-            <a:ext cx="5486400" cy="457200"/>
+            <a:ext cx="5486400" cy="365760"/>
           </a:xfrm>
           <a:prstGeom prst="rect">
             <a:avLst/>
@@ -3859,7 +3832,7 @@
           <a:lstStyle/>
           <a:p>
             <a:pPr algn="ctr">
-              <a:defRPr sz="1600"/>
+              <a:defRPr sz="1500"/>
             </a:pPr>
             <a:r>
               <a:t>전략: 상환 부담 없는 정부지원금 비율(50%) 확대</a:t>
@@ -3876,7 +3849,7 @@
         <p:spPr>
           <a:xfrm>
             <a:off x="731520" y="2560320"/>
-            <a:ext cx="2560320" cy="2286000"/>
+            <a:ext cx="2468880" cy="2743200"/>
           </a:xfrm>
           <a:prstGeom prst="rect">
             <a:avLst/>
@@ -3890,12 +3863,13 @@
           <a:lstStyle/>
           <a:p>
             <a:pPr>
-              <a:defRPr sz="1500" b="1"/>
+              <a:defRPr sz="1400" b="1"/>
             </a:pPr>
             <a:r>
               <a:t>자기자본 (20%)</a:t>
             </a:r>
           </a:p>
+          <a:p/>
           <a:p>
             <a:pPr>
               <a:defRPr sz="2000" b="1">
@@ -3904,20 +3878,11 @@
                 </a:solidFill>
               </a:defRPr>
             </a:pPr>
-          </a:p>
-          <a:p>
-            <a:pPr>
-              <a:defRPr sz="1200"/>
-            </a:pPr>
             <a:r>
               <a:t>2,000만 원</a:t>
             </a:r>
           </a:p>
-          <a:p>
-            <a:pPr>
-              <a:defRPr sz="1200"/>
-            </a:pPr>
-          </a:p>
+          <a:p/>
           <a:p>
             <a:pPr>
               <a:defRPr sz="1200"/>
@@ -3937,7 +3902,7 @@
         <p:spPr>
           <a:xfrm>
             <a:off x="3474720" y="2560320"/>
-            <a:ext cx="2560320" cy="2286000"/>
+            <a:ext cx="2468880" cy="2743200"/>
           </a:xfrm>
           <a:prstGeom prst="rect">
             <a:avLst/>
@@ -3951,12 +3916,13 @@
           <a:lstStyle/>
           <a:p>
             <a:pPr>
-              <a:defRPr sz="1500" b="1"/>
+              <a:defRPr sz="1400" b="1"/>
             </a:pPr>
             <a:r>
               <a:t>정부지원 (50%)</a:t>
             </a:r>
           </a:p>
+          <a:p/>
           <a:p>
             <a:pPr>
               <a:defRPr sz="2000" b="1">
@@ -3965,32 +3931,19 @@
                 </a:solidFill>
               </a:defRPr>
             </a:pPr>
-          </a:p>
+            <a:r>
+              <a:t>5,000만 원</a:t>
+            </a:r>
+          </a:p>
+          <a:p/>
           <a:p>
             <a:pPr>
               <a:defRPr sz="1200"/>
             </a:pPr>
             <a:r>
-              <a:t>5,000만 원</a:t>
-            </a:r>
-          </a:p>
-          <a:p>
-            <a:pPr>
-              <a:defRPr sz="1200"/>
-            </a:pPr>
-          </a:p>
-          <a:p>
-            <a:pPr>
-              <a:defRPr sz="1200"/>
-            </a:pPr>
-            <a:r>
               <a:t>사회적기업 육성사업</a:t>
             </a:r>
-          </a:p>
-          <a:p>
-            <a:pPr>
-              <a:defRPr sz="1200"/>
-            </a:pPr>
+            <a:br/>
             <a:r>
               <a:t>장애인공단 기기지원</a:t>
             </a:r>
@@ -4006,7 +3959,7 @@
         <p:spPr>
           <a:xfrm>
             <a:off x="6217920" y="2560320"/>
-            <a:ext cx="2560320" cy="2286000"/>
+            <a:ext cx="2468880" cy="2743200"/>
           </a:xfrm>
           <a:prstGeom prst="rect">
             <a:avLst/>
@@ -4020,12 +3973,13 @@
           <a:lstStyle/>
           <a:p>
             <a:pPr>
-              <a:defRPr sz="1500" b="1"/>
+              <a:defRPr sz="1400" b="1"/>
             </a:pPr>
             <a:r>
               <a:t>정책융자 (30%)</a:t>
             </a:r>
           </a:p>
+          <a:p/>
           <a:p>
             <a:pPr>
               <a:defRPr sz="2000" b="1">
@@ -4034,20 +3988,11 @@
                 </a:solidFill>
               </a:defRPr>
             </a:pPr>
-          </a:p>
-          <a:p>
-            <a:pPr>
-              <a:defRPr sz="1200"/>
-            </a:pPr>
             <a:r>
               <a:t>3,000만 원</a:t>
             </a:r>
           </a:p>
-          <a:p>
-            <a:pPr>
-              <a:defRPr sz="1200"/>
-            </a:pPr>
-          </a:p>
+          <a:p/>
           <a:p>
             <a:pPr>
               <a:defRPr sz="1200"/>
@@ -4084,8 +4029,8 @@
         </p:nvSpPr>
         <p:spPr>
           <a:xfrm>
-            <a:off x="457200" y="274320"/>
-            <a:ext cx="8229600" cy="548640"/>
+            <a:off x="457200" y="365760"/>
+            <a:ext cx="8229600" cy="457200"/>
           </a:xfrm>
           <a:prstGeom prst="rect">
             <a:avLst/>
@@ -4093,13 +4038,13 @@
           <a:noFill/>
         </p:spPr>
         <p:txBody>
-          <a:bodyPr wrap="none">
+          <a:bodyPr wrap="square">
             <a:spAutoFit/>
           </a:bodyPr>
           <a:lstStyle/>
           <a:p>
             <a:pPr>
-              <a:defRPr sz="2800" b="1">
+              <a:defRPr sz="2600" b="1">
                 <a:solidFill>
                   <a:srgbClr val="0F172A"/>
                 </a:solidFill>
@@ -4111,18 +4056,18 @@
           </a:p>
         </p:txBody>
       </p:sp>
-      <p:sp>
-        <p:nvSpPr>
-          <p:cNvPr id="3" name="Rectangle 2"/>
-          <p:cNvSpPr/>
+      <p:cxnSp>
+        <p:nvCxnSpPr>
+          <p:cNvPr id="3" name="Connector 2"/>
+          <p:cNvCxnSpPr/>
           <p:nvPr/>
-        </p:nvSpPr>
-        <p:spPr>
-          <a:xfrm>
-            <a:off x="457200" y="868680"/>
+        </p:nvCxnSpPr>
+        <p:spPr>
+          <a:xfrm>
+            <a:off x="457200" y="914400"/>
             <a:ext cx="8229600" cy="0"/>
           </a:xfrm>
-          <a:prstGeom prst="rect">
+          <a:prstGeom prst="line">
             <a:avLst/>
           </a:prstGeom>
           <a:ln w="50800">
@@ -4132,27 +4077,20 @@
           </a:ln>
         </p:spPr>
         <p:style>
-          <a:lnRef idx="1">
+          <a:lnRef idx="2">
             <a:schemeClr val="accent1"/>
           </a:lnRef>
-          <a:fillRef idx="3">
+          <a:fillRef idx="0">
             <a:schemeClr val="accent1"/>
           </a:fillRef>
-          <a:effectRef idx="2">
+          <a:effectRef idx="1">
             <a:schemeClr val="accent1"/>
           </a:effectRef>
           <a:fontRef idx="minor">
-            <a:schemeClr val="lt1"/>
+            <a:schemeClr val="tx1"/>
           </a:fontRef>
         </p:style>
-        <p:txBody>
-          <a:bodyPr rtlCol="0" anchor="ctr"/>
-          <a:lstStyle/>
-          <a:p>
-            <a:pPr algn="ctr"/>
-          </a:p>
-        </p:txBody>
-      </p:sp>
+      </p:cxnSp>
       <p:sp>
         <p:nvSpPr>
           <p:cNvPr id="4" name="TextBox 3"/>
@@ -4162,7 +4100,7 @@
         <p:spPr>
           <a:xfrm>
             <a:off x="457200" y="1828800"/>
-            <a:ext cx="1554480" cy="3657600"/>
+            <a:ext cx="1554480" cy="4114800"/>
           </a:xfrm>
           <a:prstGeom prst="rect">
             <a:avLst/>
@@ -4176,7 +4114,7 @@
           <a:lstStyle/>
           <a:p>
             <a:pPr>
-              <a:defRPr sz="1300" b="1">
+              <a:defRPr sz="1200" b="1">
                 <a:solidFill>
                   <a:srgbClr val="3B82F6"/>
                 </a:solidFill>
@@ -4186,14 +4124,10 @@
               <a:t>1년차 (진입)</a:t>
             </a:r>
           </a:p>
-          <a:p>
-            <a:pPr>
-              <a:defRPr sz="1100"/>
-            </a:pPr>
-          </a:p>
-          <a:p>
-            <a:pPr>
-              <a:defRPr sz="1100"/>
+          <a:p/>
+          <a:p>
+            <a:pPr>
+              <a:defRPr sz="1000"/>
             </a:pPr>
             <a:r>
               <a:t>• 법인 설립</a:t>
@@ -4201,7 +4135,7 @@
           </a:p>
           <a:p>
             <a:pPr>
-              <a:defRPr sz="1100"/>
+              <a:defRPr sz="1000"/>
             </a:pPr>
             <a:r>
               <a:t>• 예비사회적기업 지정</a:t>
@@ -4209,7 +4143,7 @@
           </a:p>
           <a:p>
             <a:pPr>
-              <a:defRPr sz="1100"/>
+              <a:defRPr sz="1000"/>
             </a:pPr>
             <a:r>
               <a:t>• 시제품 5종 개발</a:t>
@@ -4226,7 +4160,7 @@
         <p:spPr>
           <a:xfrm>
             <a:off x="2194560" y="1828800"/>
-            <a:ext cx="1554480" cy="3657600"/>
+            <a:ext cx="1554480" cy="4114800"/>
           </a:xfrm>
           <a:prstGeom prst="rect">
             <a:avLst/>
@@ -4240,7 +4174,7 @@
           <a:lstStyle/>
           <a:p>
             <a:pPr>
-              <a:defRPr sz="1300" b="1">
+              <a:defRPr sz="1200" b="1">
                 <a:solidFill>
                   <a:srgbClr val="3B82F6"/>
                 </a:solidFill>
@@ -4250,14 +4184,10 @@
               <a:t>2년차 (성장)</a:t>
             </a:r>
           </a:p>
-          <a:p>
-            <a:pPr>
-              <a:defRPr sz="1100"/>
-            </a:pPr>
-          </a:p>
-          <a:p>
-            <a:pPr>
-              <a:defRPr sz="1100"/>
+          <a:p/>
+          <a:p>
+            <a:pPr>
+              <a:defRPr sz="1000"/>
             </a:pPr>
             <a:r>
               <a:t>• 매출 3억 달성</a:t>
@@ -4265,7 +4195,7 @@
           </a:p>
           <a:p>
             <a:pPr>
-              <a:defRPr sz="1100"/>
+              <a:defRPr sz="1000"/>
             </a:pPr>
             <a:r>
               <a:t>• 장애인 표준사업장 신청 준비</a:t>
@@ -4273,7 +4203,7 @@
           </a:p>
           <a:p>
             <a:pPr>
-              <a:defRPr sz="1100"/>
+              <a:defRPr sz="1000"/>
             </a:pPr>
             <a:r>
               <a:t>• 고정 거래처 10곳</a:t>
@@ -4290,7 +4220,7 @@
         <p:spPr>
           <a:xfrm>
             <a:off x="3931920" y="1828800"/>
-            <a:ext cx="1554480" cy="3657600"/>
+            <a:ext cx="1554480" cy="4114800"/>
           </a:xfrm>
           <a:prstGeom prst="rect">
             <a:avLst/>
@@ -4304,7 +4234,7 @@
           <a:lstStyle/>
           <a:p>
             <a:pPr>
-              <a:defRPr sz="1300" b="1">
+              <a:defRPr sz="1200" b="1">
                 <a:solidFill>
                   <a:srgbClr val="10B981"/>
                 </a:solidFill>
@@ -4314,14 +4244,10 @@
               <a:t>3년차 (도약)</a:t>
             </a:r>
           </a:p>
-          <a:p>
-            <a:pPr>
-              <a:defRPr sz="1100"/>
-            </a:pPr>
-          </a:p>
-          <a:p>
-            <a:pPr>
-              <a:defRPr sz="1100"/>
+          <a:p/>
+          <a:p>
+            <a:pPr>
+              <a:defRPr sz="1000"/>
             </a:pPr>
             <a:r>
               <a:t>• 사회적기업 본인증</a:t>
@@ -4329,7 +4255,7 @@
           </a:p>
           <a:p>
             <a:pPr>
-              <a:defRPr sz="1100"/>
+              <a:defRPr sz="1000"/>
             </a:pPr>
             <a:r>
               <a:t>• 장애인 표준사업장 인증 완료</a:t>
@@ -4337,7 +4263,7 @@
           </a:p>
           <a:p>
             <a:pPr>
-              <a:defRPr sz="1100"/>
+              <a:defRPr sz="1000"/>
             </a:pPr>
             <a:r>
               <a:t>• 공장 확장 이전</a:t>
@@ -4345,7 +4271,7 @@
           </a:p>
           <a:p>
             <a:pPr>
-              <a:defRPr sz="1100"/>
+              <a:defRPr sz="1000"/>
             </a:pPr>
             <a:r>
               <a:t>• 취약계층 10명 고용</a:t>
@@ -4362,7 +4288,7 @@
         <p:spPr>
           <a:xfrm>
             <a:off x="5669279" y="1828800"/>
-            <a:ext cx="1554480" cy="3657600"/>
+            <a:ext cx="1554480" cy="4114800"/>
           </a:xfrm>
           <a:prstGeom prst="rect">
             <a:avLst/>
@@ -4376,7 +4302,7 @@
           <a:lstStyle/>
           <a:p>
             <a:pPr>
-              <a:defRPr sz="1300" b="1">
+              <a:defRPr sz="1200" b="1">
                 <a:solidFill>
                   <a:srgbClr val="10B981"/>
                 </a:solidFill>
@@ -4386,14 +4312,10 @@
               <a:t>4년차 (확장)</a:t>
             </a:r>
           </a:p>
-          <a:p>
-            <a:pPr>
-              <a:defRPr sz="1100"/>
-            </a:pPr>
-          </a:p>
-          <a:p>
-            <a:pPr>
-              <a:defRPr sz="1100"/>
+          <a:p/>
+          <a:p>
+            <a:pPr>
+              <a:defRPr sz="1000"/>
             </a:pPr>
             <a:r>
               <a:t>• 신제품 라인업 확대</a:t>
@@ -4401,7 +4323,7 @@
           </a:p>
           <a:p>
             <a:pPr>
-              <a:defRPr sz="1100"/>
+              <a:defRPr sz="1000"/>
             </a:pPr>
             <a:r>
               <a:t>• 지역 협력 공장 네트워크 구축</a:t>
@@ -4409,7 +4331,7 @@
           </a:p>
           <a:p>
             <a:pPr>
-              <a:defRPr sz="1100"/>
+              <a:defRPr sz="1000"/>
             </a:pPr>
             <a:r>
               <a:t>• 전국 유통망 확대</a:t>
@@ -4426,7 +4348,7 @@
         <p:spPr>
           <a:xfrm>
             <a:off x="7406640" y="1828800"/>
-            <a:ext cx="1554480" cy="3657600"/>
+            <a:ext cx="1554480" cy="4114800"/>
           </a:xfrm>
           <a:prstGeom prst="rect">
             <a:avLst/>
@@ -4440,7 +4362,7 @@
           <a:lstStyle/>
           <a:p>
             <a:pPr>
-              <a:defRPr sz="1300" b="1">
+              <a:defRPr sz="1200" b="1">
                 <a:solidFill>
                   <a:srgbClr val="F59E0B"/>
                 </a:solidFill>
@@ -4450,14 +4372,10 @@
               <a:t>5년차 (Global)</a:t>
             </a:r>
           </a:p>
-          <a:p>
-            <a:pPr>
-              <a:defRPr sz="1100"/>
-            </a:pPr>
-          </a:p>
-          <a:p>
-            <a:pPr>
-              <a:defRPr sz="1100"/>
+          <a:p/>
+          <a:p>
+            <a:pPr>
+              <a:defRPr sz="1000"/>
             </a:pPr>
             <a:r>
               <a:t>• 해외 수출 시작(베트남)</a:t>
@@ -4465,7 +4383,7 @@
           </a:p>
           <a:p>
             <a:pPr>
-              <a:defRPr sz="1100"/>
+              <a:defRPr sz="1000"/>
             </a:pPr>
             <a:r>
               <a:t>• 연 매출 10억 달성</a:t>
@@ -4473,7 +4391,7 @@
           </a:p>
           <a:p>
             <a:pPr>
-              <a:defRPr sz="1100"/>
+              <a:defRPr sz="1000"/>
             </a:pPr>
             <a:r>
               <a:t>• K-Eco 브랜드화</a:t>
@@ -4507,8 +4425,8 @@
         </p:nvSpPr>
         <p:spPr>
           <a:xfrm>
-            <a:off x="457200" y="274320"/>
-            <a:ext cx="8229600" cy="548640"/>
+            <a:off x="457200" y="365760"/>
+            <a:ext cx="8229600" cy="457200"/>
           </a:xfrm>
           <a:prstGeom prst="rect">
             <a:avLst/>
@@ -4516,13 +4434,13 @@
           <a:noFill/>
         </p:spPr>
         <p:txBody>
-          <a:bodyPr wrap="none">
+          <a:bodyPr wrap="square">
             <a:spAutoFit/>
           </a:bodyPr>
           <a:lstStyle/>
           <a:p>
             <a:pPr>
-              <a:defRPr sz="2800" b="1">
+              <a:defRPr sz="2600" b="1">
                 <a:solidFill>
                   <a:srgbClr val="0F172A"/>
                 </a:solidFill>
@@ -4534,18 +4452,18 @@
           </a:p>
         </p:txBody>
       </p:sp>
-      <p:sp>
-        <p:nvSpPr>
-          <p:cNvPr id="3" name="Rectangle 2"/>
-          <p:cNvSpPr/>
+      <p:cxnSp>
+        <p:nvCxnSpPr>
+          <p:cNvPr id="3" name="Connector 2"/>
+          <p:cNvCxnSpPr/>
           <p:nvPr/>
-        </p:nvSpPr>
-        <p:spPr>
-          <a:xfrm>
-            <a:off x="457200" y="868680"/>
+        </p:nvCxnSpPr>
+        <p:spPr>
+          <a:xfrm>
+            <a:off x="457200" y="914400"/>
             <a:ext cx="8229600" cy="0"/>
           </a:xfrm>
-          <a:prstGeom prst="rect">
+          <a:prstGeom prst="line">
             <a:avLst/>
           </a:prstGeom>
           <a:ln w="50800">
@@ -4555,27 +4473,20 @@
           </a:ln>
         </p:spPr>
         <p:style>
-          <a:lnRef idx="1">
+          <a:lnRef idx="2">
             <a:schemeClr val="accent1"/>
           </a:lnRef>
-          <a:fillRef idx="3">
+          <a:fillRef idx="0">
             <a:schemeClr val="accent1"/>
           </a:fillRef>
-          <a:effectRef idx="2">
+          <a:effectRef idx="1">
             <a:schemeClr val="accent1"/>
           </a:effectRef>
           <a:fontRef idx="minor">
-            <a:schemeClr val="lt1"/>
+            <a:schemeClr val="tx1"/>
           </a:fontRef>
         </p:style>
-        <p:txBody>
-          <a:bodyPr rtlCol="0" anchor="ctr"/>
-          <a:lstStyle/>
-          <a:p>
-            <a:pPr algn="ctr"/>
-          </a:p>
-        </p:txBody>
-      </p:sp>
+      </p:cxnSp>
       <p:graphicFrame>
         <p:nvGraphicFramePr>
           <p:cNvPr id="4" name="Table 3"/>
@@ -4585,7 +4496,7 @@
           <p:nvPr/>
         </p:nvGraphicFramePr>
         <p:xfrm>
-          <a:off x="1371600" y="1828800"/>
+          <a:off x="1371600" y="2011680"/>
           <a:ext cx="6400800" cy="2286000"/>
         </p:xfrm>
         <a:graphic>
@@ -4607,7 +4518,7 @@
                     <a:lstStyle/>
                     <a:p>
                       <a:pPr>
-                        <a:defRPr sz="1400" b="1"/>
+                        <a:defRPr sz="1300" b="1"/>
                       </a:pPr>
                       <a:r>
                         <a:t>구분 (단위: 백만 원)</a:t>
@@ -4622,7 +4533,7 @@
                     <a:lstStyle/>
                     <a:p>
                       <a:pPr>
-                        <a:defRPr sz="1400" b="1"/>
+                        <a:defRPr sz="1300" b="1"/>
                       </a:pPr>
                       <a:r>
                         <a:t>1년차</a:t>
@@ -4637,7 +4548,7 @@
                     <a:lstStyle/>
                     <a:p>
                       <a:pPr>
-                        <a:defRPr sz="1400" b="1"/>
+                        <a:defRPr sz="1300" b="1"/>
                       </a:pPr>
                       <a:r>
                         <a:t>2년차</a:t>
@@ -4652,7 +4563,7 @@
                     <a:lstStyle/>
                     <a:p>
                       <a:pPr>
-                        <a:defRPr sz="1400" b="1"/>
+                        <a:defRPr sz="1300" b="1"/>
                       </a:pPr>
                       <a:r>
                         <a:t>3년차</a:t>
@@ -4669,7 +4580,7 @@
                     <a:lstStyle/>
                     <a:p>
                       <a:pPr>
-                        <a:defRPr sz="1400"/>
+                        <a:defRPr sz="1300"/>
                       </a:pPr>
                       <a:r>
                         <a:t>매출액</a:t>
@@ -4684,7 +4595,7 @@
                     <a:lstStyle/>
                     <a:p>
                       <a:pPr>
-                        <a:defRPr sz="1400"/>
+                        <a:defRPr sz="1300"/>
                       </a:pPr>
                       <a:r>
                         <a:t>120</a:t>
@@ -4699,7 +4610,7 @@
                     <a:lstStyle/>
                     <a:p>
                       <a:pPr>
-                        <a:defRPr sz="1400"/>
+                        <a:defRPr sz="1300"/>
                       </a:pPr>
                       <a:r>
                         <a:t>300</a:t>
@@ -4714,7 +4625,7 @@
                     <a:lstStyle/>
                     <a:p>
                       <a:pPr>
-                        <a:defRPr sz="1400"/>
+                        <a:defRPr sz="1300"/>
                       </a:pPr>
                       <a:r>
                         <a:t>500</a:t>
@@ -4731,7 +4642,7 @@
                     <a:lstStyle/>
                     <a:p>
                       <a:pPr>
-                        <a:defRPr sz="1400"/>
+                        <a:defRPr sz="1300"/>
                       </a:pPr>
                       <a:r>
                         <a:t>매출원가</a:t>
@@ -4746,7 +4657,7 @@
                     <a:lstStyle/>
                     <a:p>
                       <a:pPr>
-                        <a:defRPr sz="1400"/>
+                        <a:defRPr sz="1300"/>
                       </a:pPr>
                       <a:r>
                         <a:t>40</a:t>
@@ -4761,7 +4672,7 @@
                     <a:lstStyle/>
                     <a:p>
                       <a:pPr>
-                        <a:defRPr sz="1400"/>
+                        <a:defRPr sz="1300"/>
                       </a:pPr>
                       <a:r>
                         <a:t>100</a:t>
@@ -4776,7 +4687,7 @@
                     <a:lstStyle/>
                     <a:p>
                       <a:pPr>
-                        <a:defRPr sz="1400"/>
+                        <a:defRPr sz="1300"/>
                       </a:pPr>
                       <a:r>
                         <a:t>165</a:t>
@@ -4793,7 +4704,7 @@
                     <a:lstStyle/>
                     <a:p>
                       <a:pPr>
-                        <a:defRPr sz="1400"/>
+                        <a:defRPr sz="1300"/>
                       </a:pPr>
                       <a:r>
                         <a:t>판관비 (인건비 포함)</a:t>
@@ -4808,7 +4719,7 @@
                     <a:lstStyle/>
                     <a:p>
                       <a:pPr>
-                        <a:defRPr sz="1400"/>
+                        <a:defRPr sz="1300"/>
                       </a:pPr>
                       <a:r>
                         <a:t>100</a:t>
@@ -4823,7 +4734,7 @@
                     <a:lstStyle/>
                     <a:p>
                       <a:pPr>
-                        <a:defRPr sz="1400"/>
+                        <a:defRPr sz="1300"/>
                       </a:pPr>
                       <a:r>
                         <a:t>180</a:t>
@@ -4838,7 +4749,7 @@
                     <a:lstStyle/>
                     <a:p>
                       <a:pPr>
-                        <a:defRPr sz="1400"/>
+                        <a:defRPr sz="1300"/>
                       </a:pPr>
                       <a:r>
                         <a:t>250</a:t>
@@ -4855,7 +4766,7 @@
                     <a:lstStyle/>
                     <a:p>
                       <a:pPr>
-                        <a:defRPr sz="1400" b="1"/>
+                        <a:defRPr sz="1300" b="1"/>
                       </a:pPr>
                       <a:r>
                         <a:t>영업이익</a:t>
@@ -4870,7 +4781,7 @@
                     <a:lstStyle/>
                     <a:p>
                       <a:pPr>
-                        <a:defRPr sz="1400" b="1"/>
+                        <a:defRPr sz="1300" b="1"/>
                       </a:pPr>
                       <a:r>
                         <a:t>△20</a:t>
@@ -4885,7 +4796,7 @@
                     <a:lstStyle/>
                     <a:p>
                       <a:pPr>
-                        <a:defRPr sz="1400" b="1"/>
+                        <a:defRPr sz="1300" b="1"/>
                       </a:pPr>
                       <a:r>
                         <a:t>20</a:t>
@@ -4900,7 +4811,7 @@
                     <a:lstStyle/>
                     <a:p>
                       <a:pPr>
-                        <a:defRPr sz="1400" b="1"/>
+                        <a:defRPr sz="1300" b="1"/>
                       </a:pPr>
                       <a:r>
                         <a:t>85</a:t>
@@ -4922,8 +4833,8 @@
         </p:nvSpPr>
         <p:spPr>
           <a:xfrm>
-            <a:off x="1371600" y="5029200"/>
-            <a:ext cx="6400800" cy="457200"/>
+            <a:off x="1371600" y="4846320"/>
+            <a:ext cx="6400800" cy="365760"/>
           </a:xfrm>
           <a:prstGeom prst="rect">
             <a:avLst/>
@@ -4971,8 +4882,8 @@
         </p:nvSpPr>
         <p:spPr>
           <a:xfrm>
-            <a:off x="457200" y="274320"/>
-            <a:ext cx="8229600" cy="548640"/>
+            <a:off x="457200" y="365760"/>
+            <a:ext cx="8229600" cy="457200"/>
           </a:xfrm>
           <a:prstGeom prst="rect">
             <a:avLst/>
@@ -4980,13 +4891,13 @@
           <a:noFill/>
         </p:spPr>
         <p:txBody>
-          <a:bodyPr wrap="none">
+          <a:bodyPr wrap="square">
             <a:spAutoFit/>
           </a:bodyPr>
           <a:lstStyle/>
           <a:p>
             <a:pPr>
-              <a:defRPr sz="2800" b="1">
+              <a:defRPr sz="2600" b="1">
                 <a:solidFill>
                   <a:srgbClr val="0F172A"/>
                 </a:solidFill>
@@ -4998,18 +4909,18 @@
           </a:p>
         </p:txBody>
       </p:sp>
-      <p:sp>
-        <p:nvSpPr>
-          <p:cNvPr id="3" name="Rectangle 2"/>
-          <p:cNvSpPr/>
+      <p:cxnSp>
+        <p:nvCxnSpPr>
+          <p:cNvPr id="3" name="Connector 2"/>
+          <p:cNvCxnSpPr/>
           <p:nvPr/>
-        </p:nvSpPr>
-        <p:spPr>
-          <a:xfrm>
-            <a:off x="457200" y="868680"/>
+        </p:nvCxnSpPr>
+        <p:spPr>
+          <a:xfrm>
+            <a:off x="457200" y="914400"/>
             <a:ext cx="8229600" cy="0"/>
           </a:xfrm>
-          <a:prstGeom prst="rect">
+          <a:prstGeom prst="line">
             <a:avLst/>
           </a:prstGeom>
           <a:ln w="50800">
@@ -5019,27 +4930,20 @@
           </a:ln>
         </p:spPr>
         <p:style>
-          <a:lnRef idx="1">
+          <a:lnRef idx="2">
             <a:schemeClr val="accent1"/>
           </a:lnRef>
-          <a:fillRef idx="3">
+          <a:fillRef idx="0">
             <a:schemeClr val="accent1"/>
           </a:fillRef>
-          <a:effectRef idx="2">
+          <a:effectRef idx="1">
             <a:schemeClr val="accent1"/>
           </a:effectRef>
           <a:fontRef idx="minor">
-            <a:schemeClr val="lt1"/>
+            <a:schemeClr val="tx1"/>
           </a:fontRef>
         </p:style>
-        <p:txBody>
-          <a:bodyPr rtlCol="0" anchor="ctr"/>
-          <a:lstStyle/>
-          <a:p>
-            <a:pPr algn="ctr"/>
-          </a:p>
-        </p:txBody>
-      </p:sp>
+      </p:cxnSp>
       <p:sp>
         <p:nvSpPr>
           <p:cNvPr id="4" name="TextBox 3"/>
@@ -5049,7 +4953,7 @@
         <p:spPr>
           <a:xfrm>
             <a:off x="1371600" y="2286000"/>
-            <a:ext cx="3200400" cy="1828800"/>
+            <a:ext cx="3200400" cy="2286000"/>
           </a:xfrm>
           <a:prstGeom prst="rect">
             <a:avLst/>
@@ -5062,13 +4966,14 @@
           </a:bodyPr>
           <a:lstStyle/>
           <a:p>
-            <a:pPr>
+            <a:pPr algn="ctr">
               <a:defRPr sz="1600"/>
             </a:pPr>
             <a:r>
               <a:t>BEP 달성 예상 시점</a:t>
             </a:r>
           </a:p>
+          <a:p/>
           <a:p>
             <a:pPr algn="ctr">
               <a:defRPr sz="6000" b="1">
@@ -5077,8 +4982,6 @@
                 </a:solidFill>
               </a:defRPr>
             </a:pPr>
-          </a:p>
-          <a:p>
             <a:r>
               <a:t>8개월</a:t>
             </a:r>
@@ -5093,8 +4996,8 @@
         </p:nvSpPr>
         <p:spPr>
           <a:xfrm>
-            <a:off x="5029200" y="1645920"/>
-            <a:ext cx="3657600" cy="3657600"/>
+            <a:off x="4754880" y="1645920"/>
+            <a:ext cx="3657600" cy="4114800"/>
           </a:xfrm>
           <a:prstGeom prst="rect">
             <a:avLst/>
@@ -5108,86 +5011,70 @@
           <a:lstStyle/>
           <a:p>
             <a:pPr>
-              <a:defRPr sz="1600" b="1"/>
+              <a:defRPr sz="1500" b="1"/>
             </a:pPr>
             <a:r>
               <a:t>달성 조건 및 전략</a:t>
             </a:r>
           </a:p>
-          <a:p>
-            <a:pPr>
-              <a:defRPr sz="1300"/>
-            </a:pPr>
-          </a:p>
-          <a:p>
-            <a:pPr>
-              <a:defRPr sz="1300"/>
+          <a:p/>
+          <a:p>
+            <a:pPr>
+              <a:defRPr sz="1200"/>
             </a:pPr>
             <a:r>
               <a:t>• 달성 조건: 월 매출 1,400만 원</a:t>
             </a:r>
-          </a:p>
-          <a:p>
-            <a:pPr>
-              <a:defRPr sz="1300"/>
-            </a:pPr>
-            <a:r>
-              <a:t>  (BEP = 고정비 700만원 ÷ 공헌이익률 50%)</a:t>
-            </a:r>
-          </a:p>
-          <a:p>
-            <a:pPr>
-              <a:defRPr sz="1300"/>
-            </a:pPr>
-          </a:p>
-          <a:p>
-            <a:pPr>
-              <a:defRPr sz="1300"/>
+            <a:br/>
+            <a:r>
+              <a:t>  (BEP = 고정비 700만원 ÷ 공헌이익률 50%).</a:t>
+            </a:r>
+          </a:p>
+          <a:p>
+            <a:pPr>
+              <a:defRPr sz="1200"/>
+            </a:pPr>
+          </a:p>
+          <a:p>
+            <a:pPr>
+              <a:defRPr sz="1200"/>
             </a:pPr>
             <a:r>
               <a:t>• 고정비 최소화: 월 700만 원</a:t>
             </a:r>
-          </a:p>
-          <a:p>
-            <a:pPr>
-              <a:defRPr sz="1300"/>
-            </a:pPr>
-            <a:r>
-              <a:t>  (인건비 지원 반영 후 자부담분)</a:t>
-            </a:r>
-          </a:p>
-          <a:p>
-            <a:pPr>
-              <a:defRPr sz="1300"/>
-            </a:pPr>
-          </a:p>
-          <a:p>
-            <a:pPr>
-              <a:defRPr sz="1300"/>
-            </a:pPr>
-            <a:r>
-              <a:t>• 공헌이익률: 50% (제조업 특성)</a:t>
-            </a:r>
-          </a:p>
-          <a:p>
-            <a:pPr>
-              <a:defRPr sz="1300"/>
-            </a:pPr>
-          </a:p>
-          <a:p>
-            <a:pPr>
-              <a:defRPr sz="1300"/>
+            <a:br/>
+            <a:r>
+              <a:t>  (인건비 지원 반영 후 자부담분).</a:t>
+            </a:r>
+          </a:p>
+          <a:p>
+            <a:pPr>
+              <a:defRPr sz="1200"/>
+            </a:pPr>
+          </a:p>
+          <a:p>
+            <a:pPr>
+              <a:defRPr sz="1200"/>
+            </a:pPr>
+            <a:r>
+              <a:t>• 공헌이익률: 50% (제조업 특성).</a:t>
+            </a:r>
+          </a:p>
+          <a:p>
+            <a:pPr>
+              <a:defRPr sz="1200"/>
+            </a:pPr>
+          </a:p>
+          <a:p>
+            <a:pPr>
+              <a:defRPr sz="1200"/>
             </a:pPr>
             <a:r>
               <a:t>• 전략: B2B 대형 계약(월 500만 원 x 2건)</a:t>
             </a:r>
-          </a:p>
-          <a:p>
-            <a:pPr>
-              <a:defRPr sz="1300"/>
-            </a:pPr>
-            <a:r>
-              <a:t>  수주 시 조기 달성 가능</a:t>
+            <a:br/>
+            <a:r>
+              <a:t>  수주 시 조기 달성 가능.</a:t>
             </a:r>
           </a:p>
         </p:txBody>
@@ -5218,8 +5105,8 @@
         </p:nvSpPr>
         <p:spPr>
           <a:xfrm>
-            <a:off x="457200" y="274320"/>
-            <a:ext cx="8229600" cy="548640"/>
+            <a:off x="457200" y="365760"/>
+            <a:ext cx="8229600" cy="457200"/>
           </a:xfrm>
           <a:prstGeom prst="rect">
             <a:avLst/>
@@ -5227,13 +5114,13 @@
           <a:noFill/>
         </p:spPr>
         <p:txBody>
-          <a:bodyPr wrap="none">
+          <a:bodyPr wrap="square">
             <a:spAutoFit/>
           </a:bodyPr>
           <a:lstStyle/>
           <a:p>
             <a:pPr>
-              <a:defRPr sz="2800" b="1">
+              <a:defRPr sz="2600" b="1">
                 <a:solidFill>
                   <a:srgbClr val="0F172A"/>
                 </a:solidFill>
@@ -5245,18 +5132,18 @@
           </a:p>
         </p:txBody>
       </p:sp>
-      <p:sp>
-        <p:nvSpPr>
-          <p:cNvPr id="3" name="Rectangle 2"/>
-          <p:cNvSpPr/>
+      <p:cxnSp>
+        <p:nvCxnSpPr>
+          <p:cNvPr id="3" name="Connector 2"/>
+          <p:cNvCxnSpPr/>
           <p:nvPr/>
-        </p:nvSpPr>
-        <p:spPr>
-          <a:xfrm>
-            <a:off x="457200" y="868680"/>
+        </p:nvCxnSpPr>
+        <p:spPr>
+          <a:xfrm>
+            <a:off x="457200" y="914400"/>
             <a:ext cx="8229600" cy="0"/>
           </a:xfrm>
-          <a:prstGeom prst="rect">
+          <a:prstGeom prst="line">
             <a:avLst/>
           </a:prstGeom>
           <a:ln w="50800">
@@ -5266,27 +5153,20 @@
           </a:ln>
         </p:spPr>
         <p:style>
-          <a:lnRef idx="1">
+          <a:lnRef idx="2">
             <a:schemeClr val="accent1"/>
           </a:lnRef>
-          <a:fillRef idx="3">
+          <a:fillRef idx="0">
             <a:schemeClr val="accent1"/>
           </a:fillRef>
-          <a:effectRef idx="2">
+          <a:effectRef idx="1">
             <a:schemeClr val="accent1"/>
           </a:effectRef>
           <a:fontRef idx="minor">
-            <a:schemeClr val="lt1"/>
+            <a:schemeClr val="tx1"/>
           </a:fontRef>
         </p:style>
-        <p:txBody>
-          <a:bodyPr rtlCol="0" anchor="ctr"/>
-          <a:lstStyle/>
-          <a:p>
-            <a:pPr algn="ctr"/>
-          </a:p>
-        </p:txBody>
-      </p:sp>
+      </p:cxnSp>
       <p:sp>
         <p:nvSpPr>
           <p:cNvPr id="4" name="TextBox 3"/>
@@ -5295,7 +5175,7 @@
         </p:nvSpPr>
         <p:spPr>
           <a:xfrm>
-            <a:off x="1371600" y="1828800"/>
+            <a:off x="1371600" y="2011680"/>
             <a:ext cx="3200400" cy="3200400"/>
           </a:xfrm>
           <a:prstGeom prst="rect">
@@ -5310,7 +5190,7 @@
           <a:lstStyle/>
           <a:p>
             <a:pPr>
-              <a:defRPr sz="1600" b="1">
+              <a:defRPr sz="1500" b="1">
                 <a:solidFill>
                   <a:srgbClr val="10B981"/>
                 </a:solidFill>
@@ -5320,25 +5200,34 @@
               <a:t>정량적 성과 (Quantitative)</a:t>
             </a:r>
           </a:p>
+          <a:p/>
           <a:p>
             <a:pPr>
               <a:defRPr sz="1300"/>
             </a:pPr>
+            <a:r>
+              <a:t>• 연간 폐플라스틱 25톤 재활용</a:t>
+            </a:r>
+            <a:br/>
+            <a:r>
+              <a:t>  (3년차 기준).</a:t>
+            </a:r>
           </a:p>
           <a:p>
             <a:pPr>
               <a:defRPr sz="1300"/>
             </a:pPr>
-            <a:r>
-              <a:t>• 연간 폐플라스틱 25톤 재활용</a:t>
-            </a:r>
           </a:p>
           <a:p>
             <a:pPr>
               <a:defRPr sz="1300"/>
             </a:pPr>
             <a:r>
-              <a:t>  (3년차 기준)</a:t>
+              <a:t>• 탄소 감축 효과</a:t>
+            </a:r>
+            <a:br/>
+            <a:r>
+              <a:t>  (소나무 1,200그루 식재 상당).</a:t>
             </a:r>
           </a:p>
           <a:p>
@@ -5351,28 +5240,7 @@
               <a:defRPr sz="1300"/>
             </a:pPr>
             <a:r>
-              <a:t>• 탄소 감축 효과</a:t>
-            </a:r>
-          </a:p>
-          <a:p>
-            <a:pPr>
-              <a:defRPr sz="1300"/>
-            </a:pPr>
-            <a:r>
-              <a:t>  (소나무 1,200그루 식재 상당)</a:t>
-            </a:r>
-          </a:p>
-          <a:p>
-            <a:pPr>
-              <a:defRPr sz="1300"/>
-            </a:pPr>
-          </a:p>
-          <a:p>
-            <a:pPr>
-              <a:defRPr sz="1300"/>
-            </a:pPr>
-            <a:r>
-              <a:t>• 취약계층 10명 일자리 창출</a:t>
+              <a:t>• 취약계층 10명 일자리 창출.</a:t>
             </a:r>
           </a:p>
         </p:txBody>
@@ -5385,7 +5253,7 @@
         </p:nvSpPr>
         <p:spPr>
           <a:xfrm>
-            <a:off x="5029200" y="1828800"/>
+            <a:off x="5029200" y="2011680"/>
             <a:ext cx="3200400" cy="3200400"/>
           </a:xfrm>
           <a:prstGeom prst="rect">
@@ -5400,7 +5268,7 @@
           <a:lstStyle/>
           <a:p>
             <a:pPr>
-              <a:defRPr sz="1600" b="1">
+              <a:defRPr sz="1500" b="1">
                 <a:solidFill>
                   <a:srgbClr val="3B82F6"/>
                 </a:solidFill>
@@ -5410,51 +5278,43 @@
               <a:t>정성적 성과 (Qualitative)</a:t>
             </a:r>
           </a:p>
+          <a:p/>
           <a:p>
             <a:pPr>
               <a:defRPr sz="1300"/>
             </a:pPr>
+            <a:r>
+              <a:t>• 근로자 우울감 척도 30% 개선.</a:t>
+            </a:r>
           </a:p>
           <a:p>
             <a:pPr>
               <a:defRPr sz="1300"/>
             </a:pPr>
-            <a:r>
-              <a:t>• 근로자 우울감 척도 30% 개선</a:t>
-            </a:r>
           </a:p>
           <a:p>
             <a:pPr>
               <a:defRPr sz="1300"/>
             </a:pPr>
+            <a:r>
+              <a:t>• 경제적 자립을 통한 탈수급</a:t>
+            </a:r>
+            <a:br/>
+            <a:r>
+              <a:t>  (수급자 탈피).</a:t>
+            </a:r>
           </a:p>
           <a:p>
             <a:pPr>
               <a:defRPr sz="1300"/>
             </a:pPr>
-            <a:r>
-              <a:t>• 경제적 자립을 통한 탈수급</a:t>
-            </a:r>
           </a:p>
           <a:p>
             <a:pPr>
               <a:defRPr sz="1300"/>
             </a:pPr>
             <a:r>
-              <a:t>  (수급자 탈피)</a:t>
-            </a:r>
-          </a:p>
-          <a:p>
-            <a:pPr>
-              <a:defRPr sz="1300"/>
-            </a:pPr>
-          </a:p>
-          <a:p>
-            <a:pPr>
-              <a:defRPr sz="1300"/>
-            </a:pPr>
-            <a:r>
-              <a:t>• 지역사회 '환경 인식' 개선</a:t>
+              <a:t>• 지역사회 '환경 인식' 개선.</a:t>
             </a:r>
           </a:p>
         </p:txBody>
@@ -5493,8 +5353,8 @@
         </p:nvSpPr>
         <p:spPr>
           <a:xfrm>
-            <a:off x="914400" y="2286000"/>
-            <a:ext cx="7315200" cy="1371600"/>
+            <a:off x="914400" y="1371600"/>
+            <a:ext cx="7315200" cy="914400"/>
           </a:xfrm>
           <a:prstGeom prst="rect">
             <a:avLst/>
@@ -5528,8 +5388,8 @@
         </p:nvSpPr>
         <p:spPr>
           <a:xfrm>
-            <a:off x="914400" y="2286000"/>
-            <a:ext cx="7315200" cy="2743200"/>
+            <a:off x="914400" y="2560320"/>
+            <a:ext cx="7315200" cy="3200400"/>
           </a:xfrm>
           <a:prstGeom prst="rect">
             <a:avLst/>
@@ -5542,10 +5402,10 @@
           </a:bodyPr>
           <a:lstStyle/>
           <a:p>
-            <a:pPr algn="ctr">
-              <a:defRPr sz="2000">
+            <a:pPr algn="l">
+              <a:defRPr sz="1800">
                 <a:solidFill>
-                  <a:srgbClr val="FFFFFF"/>
+                  <a:srgbClr val="E2E8F0"/>
                 </a:solidFill>
               </a:defRPr>
             </a:pPr>
@@ -5554,10 +5414,10 @@
             </a:r>
           </a:p>
           <a:p>
-            <a:pPr algn="ctr">
-              <a:defRPr sz="2000">
+            <a:pPr algn="l">
+              <a:defRPr sz="1800">
                 <a:solidFill>
-                  <a:srgbClr val="FFFFFF"/>
+                  <a:srgbClr val="E2E8F0"/>
                 </a:solidFill>
               </a:defRPr>
             </a:pPr>
@@ -5566,10 +5426,10 @@
             </a:r>
           </a:p>
           <a:p>
-            <a:pPr algn="ctr">
-              <a:defRPr sz="2000">
+            <a:pPr algn="l">
+              <a:defRPr sz="1800">
                 <a:solidFill>
-                  <a:srgbClr val="FFFFFF"/>
+                  <a:srgbClr val="E2E8F0"/>
                 </a:solidFill>
               </a:defRPr>
             </a:pPr>
@@ -5578,34 +5438,26 @@
             </a:r>
           </a:p>
           <a:p>
-            <a:pPr algn="ctr">
-              <a:defRPr sz="2000">
+            <a:pPr algn="l">
+              <a:defRPr sz="1800">
                 <a:solidFill>
-                  <a:srgbClr val="FFFFFF"/>
+                  <a:srgbClr val="E2E8F0"/>
                 </a:solidFill>
               </a:defRPr>
             </a:pPr>
           </a:p>
           <a:p>
-            <a:pPr algn="ctr">
-              <a:defRPr sz="2000">
+            <a:pPr algn="l">
+              <a:defRPr sz="1800">
                 <a:solidFill>
-                  <a:srgbClr val="FFFFFF"/>
+                  <a:srgbClr val="E2E8F0"/>
                 </a:solidFill>
               </a:defRPr>
             </a:pPr>
             <a:r>
               <a:t>준비된 대표, 검증된 기술, 확실한 수요처.</a:t>
             </a:r>
-          </a:p>
-          <a:p>
-            <a:pPr algn="ctr">
-              <a:defRPr sz="2000">
-                <a:solidFill>
-                  <a:srgbClr val="FFFFFF"/>
-                </a:solidFill>
-              </a:defRPr>
-            </a:pPr>
+            <a:br/>
             <a:r>
               <a:t>이제 지원금이라는 마중물이 필요합니다.</a:t>
             </a:r>
@@ -5638,8 +5490,8 @@
         </p:nvSpPr>
         <p:spPr>
           <a:xfrm>
-            <a:off x="457200" y="274320"/>
-            <a:ext cx="8229600" cy="548640"/>
+            <a:off x="457200" y="365760"/>
+            <a:ext cx="8229600" cy="457200"/>
           </a:xfrm>
           <a:prstGeom prst="rect">
             <a:avLst/>
@@ -5647,13 +5499,13 @@
           <a:noFill/>
         </p:spPr>
         <p:txBody>
-          <a:bodyPr wrap="none">
+          <a:bodyPr wrap="square">
             <a:spAutoFit/>
           </a:bodyPr>
           <a:lstStyle/>
           <a:p>
             <a:pPr>
-              <a:defRPr sz="2800" b="1">
+              <a:defRPr sz="2600" b="1">
                 <a:solidFill>
                   <a:srgbClr val="0F172A"/>
                 </a:solidFill>
@@ -5665,18 +5517,18 @@
           </a:p>
         </p:txBody>
       </p:sp>
-      <p:sp>
-        <p:nvSpPr>
-          <p:cNvPr id="3" name="Rectangle 2"/>
-          <p:cNvSpPr/>
+      <p:cxnSp>
+        <p:nvCxnSpPr>
+          <p:cNvPr id="3" name="Connector 2"/>
+          <p:cNvCxnSpPr/>
           <p:nvPr/>
-        </p:nvSpPr>
-        <p:spPr>
-          <a:xfrm>
-            <a:off x="457200" y="868680"/>
+        </p:nvCxnSpPr>
+        <p:spPr>
+          <a:xfrm>
+            <a:off x="457200" y="914400"/>
             <a:ext cx="8229600" cy="0"/>
           </a:xfrm>
-          <a:prstGeom prst="rect">
+          <a:prstGeom prst="line">
             <a:avLst/>
           </a:prstGeom>
           <a:ln w="50800">
@@ -5686,27 +5538,20 @@
           </a:ln>
         </p:spPr>
         <p:style>
-          <a:lnRef idx="1">
+          <a:lnRef idx="2">
             <a:schemeClr val="accent1"/>
           </a:lnRef>
-          <a:fillRef idx="3">
+          <a:fillRef idx="0">
             <a:schemeClr val="accent1"/>
           </a:fillRef>
-          <a:effectRef idx="2">
+          <a:effectRef idx="1">
             <a:schemeClr val="accent1"/>
           </a:effectRef>
           <a:fontRef idx="minor">
-            <a:schemeClr val="lt1"/>
+            <a:schemeClr val="tx1"/>
           </a:fontRef>
         </p:style>
-        <p:txBody>
-          <a:bodyPr rtlCol="0" anchor="ctr"/>
-          <a:lstStyle/>
-          <a:p>
-            <a:pPr algn="ctr"/>
-          </a:p>
-        </p:txBody>
-      </p:sp>
+      </p:cxnSp>
       <p:sp>
         <p:nvSpPr>
           <p:cNvPr id="4" name="TextBox 3"/>
@@ -5715,8 +5560,8 @@
         </p:nvSpPr>
         <p:spPr>
           <a:xfrm>
-            <a:off x="914400" y="1371600"/>
-            <a:ext cx="7315200" cy="914400"/>
+            <a:off x="1371600" y="1463040"/>
+            <a:ext cx="6400800" cy="548640"/>
           </a:xfrm>
           <a:prstGeom prst="rect">
             <a:avLst/>
@@ -5730,11 +5575,7 @@
           <a:lstStyle/>
           <a:p>
             <a:pPr algn="ctr">
-              <a:defRPr sz="2400" b="1">
-                <a:solidFill>
-                  <a:srgbClr val="0F172A"/>
-                </a:solidFill>
-              </a:defRPr>
+              <a:defRPr sz="2200" b="1"/>
             </a:pPr>
             <a:r>
               <a:t>"환경과 복지의 교차점에서 지속 가능한 일자리를 창출한다"</a:t>
@@ -5751,7 +5592,7 @@
         <p:spPr>
           <a:xfrm>
             <a:off x="731520" y="2560320"/>
-            <a:ext cx="2560320" cy="2286000"/>
+            <a:ext cx="2468880" cy="2926080"/>
           </a:xfrm>
           <a:prstGeom prst="rect">
             <a:avLst/>
@@ -5765,24 +5606,16 @@
           <a:lstStyle/>
           <a:p>
             <a:pPr>
-              <a:defRPr sz="1600" b="1">
-                <a:solidFill>
-                  <a:srgbClr val="0F172A"/>
-                </a:solidFill>
-              </a:defRPr>
+              <a:defRPr sz="1500" b="1"/>
             </a:pPr>
             <a:r>
               <a:t>설립 목적</a:t>
             </a:r>
           </a:p>
-          <a:p>
-            <a:pPr>
-              <a:defRPr sz="1400"/>
-            </a:pPr>
-          </a:p>
-          <a:p>
-            <a:pPr>
-              <a:defRPr sz="1400"/>
+          <a:p/>
+          <a:p>
+            <a:pPr>
+              <a:defRPr sz="1300"/>
             </a:pPr>
             <a:r>
               <a:t>단순 현금 지원이 아닌 '제조업 일자리'를 통해 취약계층의 경제적/정서적 완전 자립 실현.</a:t>
@@ -5799,7 +5632,7 @@
         <p:spPr>
           <a:xfrm>
             <a:off x="3474720" y="2560320"/>
-            <a:ext cx="2560320" cy="2286000"/>
+            <a:ext cx="2468880" cy="2926080"/>
           </a:xfrm>
           <a:prstGeom prst="rect">
             <a:avLst/>
@@ -5813,24 +5646,16 @@
           <a:lstStyle/>
           <a:p>
             <a:pPr>
-              <a:defRPr sz="1600" b="1">
-                <a:solidFill>
-                  <a:srgbClr val="0F172A"/>
-                </a:solidFill>
-              </a:defRPr>
+              <a:defRPr sz="1500" b="1"/>
             </a:pPr>
             <a:r>
               <a:t>기관 비전 (2030)</a:t>
             </a:r>
           </a:p>
-          <a:p>
-            <a:pPr>
-              <a:defRPr sz="1400"/>
-            </a:pPr>
-          </a:p>
-          <a:p>
-            <a:pPr>
-              <a:defRPr sz="1400"/>
+          <a:p/>
+          <a:p>
+            <a:pPr>
+              <a:defRPr sz="1300"/>
             </a:pPr>
             <a:r>
               <a:t>지역사회 1호 '장애인 표준사업장 인증' 친환경 제조 전문 기업 도약.</a:t>
@@ -5847,7 +5672,7 @@
         <p:spPr>
           <a:xfrm>
             <a:off x="6217920" y="2560320"/>
-            <a:ext cx="2560320" cy="2286000"/>
+            <a:ext cx="2468880" cy="2926080"/>
           </a:xfrm>
           <a:prstGeom prst="rect">
             <a:avLst/>
@@ -5861,41 +5686,25 @@
           <a:lstStyle/>
           <a:p>
             <a:pPr>
-              <a:defRPr sz="1600" b="1">
-                <a:solidFill>
-                  <a:srgbClr val="0F172A"/>
-                </a:solidFill>
-              </a:defRPr>
+              <a:defRPr sz="1500" b="1"/>
             </a:pPr>
             <a:r>
               <a:t>핵심 가치</a:t>
             </a:r>
           </a:p>
-          <a:p>
-            <a:pPr>
-              <a:defRPr sz="1400"/>
-            </a:pPr>
-          </a:p>
-          <a:p>
-            <a:pPr>
-              <a:defRPr sz="1400"/>
+          <a:p/>
+          <a:p>
+            <a:pPr>
+              <a:defRPr sz="1300"/>
             </a:pPr>
             <a:r>
               <a:t>치유(Healing)</a:t>
             </a:r>
-          </a:p>
-          <a:p>
-            <a:pPr>
-              <a:defRPr sz="1400"/>
-            </a:pPr>
+            <a:br/>
             <a:r>
               <a:t>전문(Pro)</a:t>
             </a:r>
-          </a:p>
-          <a:p>
-            <a:pPr>
-              <a:defRPr sz="1400"/>
-            </a:pPr>
+            <a:br/>
             <a:r>
               <a:t>순환(Eco)</a:t>
             </a:r>
@@ -5928,8 +5737,8 @@
         </p:nvSpPr>
         <p:spPr>
           <a:xfrm>
-            <a:off x="457200" y="274320"/>
-            <a:ext cx="8229600" cy="548640"/>
+            <a:off x="457200" y="365760"/>
+            <a:ext cx="8229600" cy="457200"/>
           </a:xfrm>
           <a:prstGeom prst="rect">
             <a:avLst/>
@@ -5937,13 +5746,13 @@
           <a:noFill/>
         </p:spPr>
         <p:txBody>
-          <a:bodyPr wrap="none">
+          <a:bodyPr wrap="square">
             <a:spAutoFit/>
           </a:bodyPr>
           <a:lstStyle/>
           <a:p>
             <a:pPr>
-              <a:defRPr sz="2800" b="1">
+              <a:defRPr sz="2600" b="1">
                 <a:solidFill>
                   <a:srgbClr val="0F172A"/>
                 </a:solidFill>
@@ -5955,18 +5764,18 @@
           </a:p>
         </p:txBody>
       </p:sp>
-      <p:sp>
-        <p:nvSpPr>
-          <p:cNvPr id="3" name="Rectangle 2"/>
-          <p:cNvSpPr/>
+      <p:cxnSp>
+        <p:nvCxnSpPr>
+          <p:cNvPr id="3" name="Connector 2"/>
+          <p:cNvCxnSpPr/>
           <p:nvPr/>
-        </p:nvSpPr>
-        <p:spPr>
-          <a:xfrm>
-            <a:off x="457200" y="868680"/>
+        </p:nvCxnSpPr>
+        <p:spPr>
+          <a:xfrm>
+            <a:off x="457200" y="914400"/>
             <a:ext cx="8229600" cy="0"/>
           </a:xfrm>
-          <a:prstGeom prst="rect">
+          <a:prstGeom prst="line">
             <a:avLst/>
           </a:prstGeom>
           <a:ln w="50800">
@@ -5976,27 +5785,20 @@
           </a:ln>
         </p:spPr>
         <p:style>
-          <a:lnRef idx="1">
+          <a:lnRef idx="2">
             <a:schemeClr val="accent1"/>
           </a:lnRef>
-          <a:fillRef idx="3">
+          <a:fillRef idx="0">
             <a:schemeClr val="accent1"/>
           </a:fillRef>
-          <a:effectRef idx="2">
+          <a:effectRef idx="1">
             <a:schemeClr val="accent1"/>
           </a:effectRef>
           <a:fontRef idx="minor">
-            <a:schemeClr val="lt1"/>
+            <a:schemeClr val="tx1"/>
           </a:fontRef>
         </p:style>
-        <p:txBody>
-          <a:bodyPr rtlCol="0" anchor="ctr"/>
-          <a:lstStyle/>
-          <a:p>
-            <a:pPr algn="ctr"/>
-          </a:p>
-        </p:txBody>
-      </p:sp>
+      </p:cxnSp>
       <p:sp>
         <p:nvSpPr>
           <p:cNvPr id="4" name="TextBox 3"/>
@@ -6005,8 +5807,8 @@
         </p:nvSpPr>
         <p:spPr>
           <a:xfrm>
-            <a:off x="731520" y="1371600"/>
-            <a:ext cx="3657600" cy="2286000"/>
+            <a:off x="731520" y="1463040"/>
+            <a:ext cx="3840480" cy="3657600"/>
           </a:xfrm>
           <a:prstGeom prst="rect">
             <a:avLst/>
@@ -6020,31 +5822,27 @@
           <a:lstStyle/>
           <a:p>
             <a:pPr>
-              <a:defRPr sz="1800" b="1"/>
+              <a:defRPr sz="1700" b="1"/>
             </a:pPr>
             <a:r>
               <a:t>창업 배경 (문제인식)</a:t>
             </a:r>
           </a:p>
-          <a:p>
-            <a:pPr>
-              <a:defRPr sz="1400"/>
-            </a:pPr>
-          </a:p>
-          <a:p>
-            <a:pPr>
-              <a:defRPr sz="1400"/>
-            </a:pPr>
-            <a:r>
-              <a:t>• 복지 사각지대: 관내 발달장애인/노인 취업률 20% 미만</a:t>
-            </a:r>
-          </a:p>
-          <a:p>
-            <a:pPr>
-              <a:defRPr sz="1400"/>
-            </a:pPr>
-            <a:r>
-              <a:t>• 환경 위기: 플라스틱 소각 비용 급증</a:t>
+          <a:p/>
+          <a:p>
+            <a:pPr>
+              <a:defRPr sz="1300"/>
+            </a:pPr>
+            <a:r>
+              <a:t>• 복지 사각지대: 관내 발달장애인/노인 취업률 20% 미만. 기존 단순 임가공 일자리는 '지속 가능한 급여' 지급 불가.</a:t>
+            </a:r>
+          </a:p>
+          <a:p>
+            <a:pPr>
+              <a:defRPr sz="1300"/>
+            </a:pPr>
+            <a:r>
+              <a:t>• 환경 위기: 플라스틱 소각 비용 급증 및 기업 ESG 실적 압박 심화.</a:t>
             </a:r>
           </a:p>
         </p:txBody>
@@ -6057,8 +5855,8 @@
         </p:nvSpPr>
         <p:spPr>
           <a:xfrm>
-            <a:off x="4754880" y="1371600"/>
-            <a:ext cx="3657600" cy="2286000"/>
+            <a:off x="4754880" y="1463040"/>
+            <a:ext cx="3840480" cy="3657600"/>
           </a:xfrm>
           <a:prstGeom prst="rect">
             <a:avLst/>
@@ -6072,33 +5870,25 @@
           <a:lstStyle/>
           <a:p>
             <a:pPr>
-              <a:defRPr sz="1800" b="1"/>
+              <a:defRPr sz="1700" b="1"/>
             </a:pPr>
             <a:r>
               <a:t>창업 동기</a:t>
             </a:r>
           </a:p>
-          <a:p>
-            <a:pPr>
-              <a:defRPr sz="1400"/>
-            </a:pPr>
-          </a:p>
-          <a:p>
-            <a:pPr>
-              <a:defRPr sz="1400"/>
+          <a:p/>
+          <a:p>
+            <a:pPr>
+              <a:defRPr sz="1500" b="1"/>
             </a:pPr>
             <a:r>
               <a:t>"45세 사회복지 전문가로서 현장의 한계를 절감했습니다."</a:t>
             </a:r>
           </a:p>
-          <a:p>
-            <a:pPr>
-              <a:defRPr sz="1400"/>
-            </a:pPr>
-          </a:p>
-          <a:p>
-            <a:pPr>
-              <a:defRPr sz="1400"/>
+          <a:p/>
+          <a:p>
+            <a:pPr>
+              <a:defRPr sz="1300"/>
             </a:pPr>
             <a:r>
               <a:t>후원금에 의존하는 복지는 지속 가능하지 않습니다. '제품 경쟁력'으로 당당하게 월급을 주는 기업을 만들기 위해 창업을 결심했습니다.</a:t>
@@ -6132,8 +5922,8 @@
         </p:nvSpPr>
         <p:spPr>
           <a:xfrm>
-            <a:off x="457200" y="274320"/>
-            <a:ext cx="8229600" cy="548640"/>
+            <a:off x="457200" y="365760"/>
+            <a:ext cx="8229600" cy="457200"/>
           </a:xfrm>
           <a:prstGeom prst="rect">
             <a:avLst/>
@@ -6141,13 +5931,13 @@
           <a:noFill/>
         </p:spPr>
         <p:txBody>
-          <a:bodyPr wrap="none">
+          <a:bodyPr wrap="square">
             <a:spAutoFit/>
           </a:bodyPr>
           <a:lstStyle/>
           <a:p>
             <a:pPr>
-              <a:defRPr sz="2800" b="1">
+              <a:defRPr sz="2600" b="1">
                 <a:solidFill>
                   <a:srgbClr val="0F172A"/>
                 </a:solidFill>
@@ -6159,18 +5949,18 @@
           </a:p>
         </p:txBody>
       </p:sp>
-      <p:sp>
-        <p:nvSpPr>
-          <p:cNvPr id="3" name="Rectangle 2"/>
-          <p:cNvSpPr/>
+      <p:cxnSp>
+        <p:nvCxnSpPr>
+          <p:cNvPr id="3" name="Connector 2"/>
+          <p:cNvCxnSpPr/>
           <p:nvPr/>
-        </p:nvSpPr>
-        <p:spPr>
-          <a:xfrm>
-            <a:off x="457200" y="868680"/>
+        </p:nvCxnSpPr>
+        <p:spPr>
+          <a:xfrm>
+            <a:off x="457200" y="914400"/>
             <a:ext cx="8229600" cy="0"/>
           </a:xfrm>
-          <a:prstGeom prst="rect">
+          <a:prstGeom prst="line">
             <a:avLst/>
           </a:prstGeom>
           <a:ln w="50800">
@@ -6180,27 +5970,20 @@
           </a:ln>
         </p:spPr>
         <p:style>
-          <a:lnRef idx="1">
+          <a:lnRef idx="2">
             <a:schemeClr val="accent1"/>
           </a:lnRef>
-          <a:fillRef idx="3">
+          <a:fillRef idx="0">
             <a:schemeClr val="accent1"/>
           </a:fillRef>
-          <a:effectRef idx="2">
+          <a:effectRef idx="1">
             <a:schemeClr val="accent1"/>
           </a:effectRef>
           <a:fontRef idx="minor">
-            <a:schemeClr val="lt1"/>
+            <a:schemeClr val="tx1"/>
           </a:fontRef>
         </p:style>
-        <p:txBody>
-          <a:bodyPr rtlCol="0" anchor="ctr"/>
-          <a:lstStyle/>
-          <a:p>
-            <a:pPr algn="ctr"/>
-          </a:p>
-        </p:txBody>
-      </p:sp>
+      </p:cxnSp>
       <p:sp>
         <p:nvSpPr>
           <p:cNvPr id="4" name="TextBox 3"/>
@@ -6209,8 +5992,8 @@
         </p:nvSpPr>
         <p:spPr>
           <a:xfrm>
-            <a:off x="731520" y="1828800"/>
-            <a:ext cx="2560320" cy="2743200"/>
+            <a:off x="731520" y="1280160"/>
+            <a:ext cx="7315200" cy="274320"/>
           </a:xfrm>
           <a:prstGeom prst="rect">
             <a:avLst/>
@@ -6224,39 +6007,10 @@
           <a:lstStyle/>
           <a:p>
             <a:pPr>
-              <a:defRPr sz="1600" b="1"/>
-            </a:pPr>
-            <a:r>
-              <a:t>1. 오프라인 (B2G/B2B)</a:t>
-            </a:r>
-          </a:p>
-          <a:p>
-            <a:pPr>
-              <a:defRPr sz="1300"/>
-            </a:pPr>
-          </a:p>
-          <a:p>
-            <a:pPr>
-              <a:defRPr sz="1300"/>
-            </a:pPr>
-            <a:r>
-              <a:t>관공서, 보건소, 대기업 ESG팀</a:t>
-            </a:r>
-          </a:p>
-          <a:p>
-            <a:pPr>
-              <a:defRPr sz="1300"/>
-            </a:pPr>
-            <a:r>
-              <a:t>• 중증장애인생산품 우선구매</a:t>
-            </a:r>
-          </a:p>
-          <a:p>
-            <a:pPr>
-              <a:defRPr sz="1300"/>
-            </a:pPr>
-            <a:r>
-              <a:t>• 기업 굿즈 납품</a:t>
+              <a:defRPr sz="1400"/>
+            </a:pPr>
+            <a:r>
+              <a:t>안정적인 수익 구조 확보를 위한 다각화 전략</a:t>
             </a:r>
           </a:p>
         </p:txBody>
@@ -6269,8 +6023,8 @@
         </p:nvSpPr>
         <p:spPr>
           <a:xfrm>
-            <a:off x="3474720" y="1828800"/>
-            <a:ext cx="2560320" cy="2743200"/>
+            <a:off x="731520" y="2011680"/>
+            <a:ext cx="2468880" cy="3200400"/>
           </a:xfrm>
           <a:prstGeom prst="rect">
             <a:avLst/>
@@ -6284,39 +6038,35 @@
           <a:lstStyle/>
           <a:p>
             <a:pPr>
-              <a:defRPr sz="1600" b="1"/>
-            </a:pPr>
-            <a:r>
-              <a:t>2. 온라인 (D2C)</a:t>
-            </a:r>
-          </a:p>
-          <a:p>
-            <a:pPr>
-              <a:defRPr sz="1300"/>
-            </a:pPr>
-          </a:p>
-          <a:p>
-            <a:pPr>
-              <a:defRPr sz="1300"/>
-            </a:pPr>
-            <a:r>
-              <a:t>가치소비 MZ세대</a:t>
-            </a:r>
-          </a:p>
-          <a:p>
-            <a:pPr>
-              <a:defRPr sz="1300"/>
-            </a:pPr>
-            <a:r>
-              <a:t>• 자사몰, 스마트스토어</a:t>
-            </a:r>
-          </a:p>
-          <a:p>
-            <a:pPr>
-              <a:defRPr sz="1300"/>
-            </a:pPr>
-            <a:r>
-              <a:t>• 와디즈/텀블벅 펀딩</a:t>
+              <a:defRPr sz="1400" b="1"/>
+            </a:pPr>
+            <a:r>
+              <a:t>1. 오프라인 (B2G/B2B)</a:t>
+            </a:r>
+          </a:p>
+          <a:p/>
+          <a:p>
+            <a:pPr>
+              <a:defRPr sz="1200"/>
+            </a:pPr>
+            <a:r>
+              <a:t>대상: 관공서, 보건소, 대기업 ESG팀</a:t>
+            </a:r>
+          </a:p>
+          <a:p>
+            <a:pPr>
+              <a:defRPr sz="1200"/>
+            </a:pPr>
+            <a:r>
+              <a:t>• '중증장애인생산품 우선구매' 활용 수의계약</a:t>
+            </a:r>
+          </a:p>
+          <a:p>
+            <a:pPr>
+              <a:defRPr sz="1200"/>
+            </a:pPr>
+            <a:r>
+              <a:t>• 기업 사내 캠페인 + 굿즈 납품</a:t>
             </a:r>
           </a:p>
         </p:txBody>
@@ -6329,8 +6079,8 @@
         </p:nvSpPr>
         <p:spPr>
           <a:xfrm>
-            <a:off x="6217920" y="1828800"/>
-            <a:ext cx="2560320" cy="2743200"/>
+            <a:off x="3474720" y="2011680"/>
+            <a:ext cx="2468880" cy="3200400"/>
           </a:xfrm>
           <a:prstGeom prst="rect">
             <a:avLst/>
@@ -6344,28 +6094,80 @@
           <a:lstStyle/>
           <a:p>
             <a:pPr>
-              <a:defRPr sz="1600" b="1"/>
-            </a:pPr>
-            <a:r>
-              <a:t>3. 글로벌 (Global)</a:t>
-            </a:r>
-          </a:p>
-          <a:p>
-            <a:pPr>
-              <a:defRPr sz="1300"/>
-            </a:pPr>
-          </a:p>
-          <a:p>
-            <a:pPr>
-              <a:defRPr sz="1300"/>
-            </a:pPr>
-            <a:r>
-              <a:t>베트남 등 동남아 시장</a:t>
-            </a:r>
-          </a:p>
-          <a:p>
-            <a:pPr>
-              <a:defRPr sz="1300"/>
+              <a:defRPr sz="1400" b="1"/>
+            </a:pPr>
+            <a:r>
+              <a:t>2. 온라인 (D2C)</a:t>
+            </a:r>
+          </a:p>
+          <a:p/>
+          <a:p>
+            <a:pPr>
+              <a:defRPr sz="1200"/>
+            </a:pPr>
+            <a:r>
+              <a:t>대상: 가치소비 MZ세대</a:t>
+            </a:r>
+          </a:p>
+          <a:p>
+            <a:pPr>
+              <a:defRPr sz="1200"/>
+            </a:pPr>
+            <a:r>
+              <a:t>• 자사몰 및 스마트스토어 운영</a:t>
+            </a:r>
+          </a:p>
+          <a:p>
+            <a:pPr>
+              <a:defRPr sz="1200"/>
+            </a:pPr>
+            <a:r>
+              <a:t>• 와디즈/텀블벅 펀딩을 통한 신제품 런칭</a:t>
+            </a:r>
+          </a:p>
+        </p:txBody>
+      </p:sp>
+      <p:sp>
+        <p:nvSpPr>
+          <p:cNvPr id="7" name="TextBox 6"/>
+          <p:cNvSpPr txBox="1"/>
+          <p:nvPr/>
+        </p:nvSpPr>
+        <p:spPr>
+          <a:xfrm>
+            <a:off x="6217920" y="2011680"/>
+            <a:ext cx="2468880" cy="3200400"/>
+          </a:xfrm>
+          <a:prstGeom prst="rect">
+            <a:avLst/>
+          </a:prstGeom>
+          <a:noFill/>
+        </p:spPr>
+        <p:txBody>
+          <a:bodyPr wrap="none">
+            <a:spAutoFit/>
+          </a:bodyPr>
+          <a:lstStyle/>
+          <a:p>
+            <a:pPr>
+              <a:defRPr sz="1400" b="1"/>
+            </a:pPr>
+            <a:r>
+              <a:t>3. 글로벌 사업 (Global)</a:t>
+            </a:r>
+          </a:p>
+          <a:p/>
+          <a:p>
+            <a:pPr>
+              <a:defRPr sz="1200"/>
+            </a:pPr>
+            <a:r>
+              <a:t>대상: 베트남 등 동남아 시장</a:t>
+            </a:r>
+          </a:p>
+          <a:p>
+            <a:pPr>
+              <a:defRPr sz="1200"/>
             </a:pPr>
             <a:r>
               <a:t>• 5년 차 해외 판로 개척</a:t>
@@ -6373,10 +6175,10 @@
           </a:p>
           <a:p>
             <a:pPr>
-              <a:defRPr sz="1300"/>
-            </a:pPr>
-            <a:r>
-              <a:t>• K-Eco 디자인 수출</a:t>
+              <a:defRPr sz="1200"/>
+            </a:pPr>
+            <a:r>
+              <a:t>• 한국형 업사이클링 디자인(K-Eco) 수출</a:t>
             </a:r>
           </a:p>
         </p:txBody>
@@ -6407,8 +6209,8 @@
         </p:nvSpPr>
         <p:spPr>
           <a:xfrm>
-            <a:off x="457200" y="274320"/>
-            <a:ext cx="8229600" cy="548640"/>
+            <a:off x="457200" y="365760"/>
+            <a:ext cx="8229600" cy="457200"/>
           </a:xfrm>
           <a:prstGeom prst="rect">
             <a:avLst/>
@@ -6416,13 +6218,13 @@
           <a:noFill/>
         </p:spPr>
         <p:txBody>
-          <a:bodyPr wrap="none">
+          <a:bodyPr wrap="square">
             <a:spAutoFit/>
           </a:bodyPr>
           <a:lstStyle/>
           <a:p>
             <a:pPr>
-              <a:defRPr sz="2800" b="1">
+              <a:defRPr sz="2600" b="1">
                 <a:solidFill>
                   <a:srgbClr val="0F172A"/>
                 </a:solidFill>
@@ -6434,18 +6236,18 @@
           </a:p>
         </p:txBody>
       </p:sp>
-      <p:sp>
-        <p:nvSpPr>
-          <p:cNvPr id="3" name="Rectangle 2"/>
-          <p:cNvSpPr/>
+      <p:cxnSp>
+        <p:nvCxnSpPr>
+          <p:cNvPr id="3" name="Connector 2"/>
+          <p:cNvCxnSpPr/>
           <p:nvPr/>
-        </p:nvSpPr>
-        <p:spPr>
-          <a:xfrm>
-            <a:off x="457200" y="868680"/>
+        </p:nvCxnSpPr>
+        <p:spPr>
+          <a:xfrm>
+            <a:off x="457200" y="914400"/>
             <a:ext cx="8229600" cy="0"/>
           </a:xfrm>
-          <a:prstGeom prst="rect">
+          <a:prstGeom prst="line">
             <a:avLst/>
           </a:prstGeom>
           <a:ln w="50800">
@@ -6455,27 +6257,20 @@
           </a:ln>
         </p:spPr>
         <p:style>
-          <a:lnRef idx="1">
+          <a:lnRef idx="2">
             <a:schemeClr val="accent1"/>
           </a:lnRef>
-          <a:fillRef idx="3">
+          <a:fillRef idx="0">
             <a:schemeClr val="accent1"/>
           </a:fillRef>
-          <a:effectRef idx="2">
+          <a:effectRef idx="1">
             <a:schemeClr val="accent1"/>
           </a:effectRef>
           <a:fontRef idx="minor">
-            <a:schemeClr val="lt1"/>
+            <a:schemeClr val="tx1"/>
           </a:fontRef>
         </p:style>
-        <p:txBody>
-          <a:bodyPr rtlCol="0" anchor="ctr"/>
-          <a:lstStyle/>
-          <a:p>
-            <a:pPr algn="ctr"/>
-          </a:p>
-        </p:txBody>
-      </p:sp>
+      </p:cxnSp>
       <p:sp>
         <p:nvSpPr>
           <p:cNvPr id="4" name="TextBox 3"/>
@@ -6485,7 +6280,7 @@
         <p:spPr>
           <a:xfrm>
             <a:off x="914400" y="1645920"/>
-            <a:ext cx="3657600" cy="2286000"/>
+            <a:ext cx="3657600" cy="3200400"/>
           </a:xfrm>
           <a:prstGeom prst="rect">
             <a:avLst/>
@@ -6499,7 +6294,7 @@
           <a:lstStyle/>
           <a:p>
             <a:pPr>
-              <a:defRPr sz="1400"/>
+              <a:defRPr sz="1500" b="1"/>
             </a:pPr>
             <a:r>
               <a:t>1. 마블링 화분</a:t>
@@ -6507,36 +6302,32 @@
           </a:p>
           <a:p>
             <a:pPr>
-              <a:defRPr sz="1400"/>
+              <a:defRPr sz="1300"/>
             </a:pPr>
             <a:r>
               <a:t>폐플라스틱 고유의 패턴을 살린 세상에 하나뿐인 디자인.</a:t>
             </a:r>
-          </a:p>
-          <a:p>
-            <a:pPr>
-              <a:defRPr sz="1400"/>
-            </a:pPr>
+            <a:br/>
             <a:r>
               <a:t>기업 로고 각인 서비스 제공.</a:t>
             </a:r>
           </a:p>
           <a:p>
             <a:pPr>
-              <a:defRPr sz="1400"/>
+              <a:defRPr b="1">
+                <a:solidFill>
+                  <a:srgbClr val="10B981"/>
+                </a:solidFill>
+              </a:defRPr>
             </a:pPr>
             <a:r>
               <a:t>예상가: 12,000원</a:t>
             </a:r>
           </a:p>
-          <a:p>
-            <a:pPr>
-              <a:defRPr sz="1400"/>
-            </a:pPr>
-          </a:p>
-          <a:p>
-            <a:pPr>
-              <a:defRPr sz="1400"/>
+          <a:p/>
+          <a:p>
+            <a:pPr>
+              <a:defRPr sz="1500" b="1"/>
             </a:pPr>
             <a:r>
               <a:t>2. 아웃도어 카라비너</a:t>
@@ -6544,23 +6335,23 @@
           </a:p>
           <a:p>
             <a:pPr>
-              <a:defRPr sz="1400"/>
-            </a:pPr>
-            <a:r>
-              <a:t>고강도 플라스틱(HDPE) 활용 캠핑/등산용 굿즈.</a:t>
-            </a:r>
-          </a:p>
-          <a:p>
-            <a:pPr>
-              <a:defRPr sz="1400"/>
-            </a:pPr>
+              <a:defRPr sz="1300"/>
+            </a:pPr>
+            <a:r>
+              <a:t>고강도 플라스틱(HDPE)을 활용한 캠핑/등산용 굿즈.</a:t>
+            </a:r>
+            <a:br/>
             <a:r>
               <a:t>내구성 테스트 완료.</a:t>
             </a:r>
           </a:p>
           <a:p>
             <a:pPr>
-              <a:defRPr sz="1400"/>
+              <a:defRPr b="1">
+                <a:solidFill>
+                  <a:srgbClr val="3B82F6"/>
+                </a:solidFill>
+              </a:defRPr>
             </a:pPr>
             <a:r>
               <a:t>예상가: 3,500원</a:t>
@@ -6576,8 +6367,8 @@
         </p:nvSpPr>
         <p:spPr>
           <a:xfrm>
-            <a:off x="5029200" y="1828800"/>
-            <a:ext cx="3200400" cy="2286000"/>
+            <a:off x="5029200" y="2011680"/>
+            <a:ext cx="3474720" cy="2743200"/>
           </a:xfrm>
           <a:prstGeom prst="rect">
             <a:avLst/>
@@ -6591,33 +6382,25 @@
           <a:lstStyle/>
           <a:p>
             <a:pPr>
-              <a:defRPr sz="1800" b="1"/>
+              <a:defRPr sz="1700" b="1"/>
             </a:pPr>
             <a:r>
               <a:t>제품 차별성</a:t>
             </a:r>
           </a:p>
-          <a:p>
-            <a:pPr>
-              <a:defRPr sz="1400"/>
-            </a:pPr>
-          </a:p>
-          <a:p>
-            <a:pPr>
-              <a:defRPr sz="1400"/>
+          <a:p/>
+          <a:p>
+            <a:pPr>
+              <a:defRPr sz="1300"/>
             </a:pPr>
             <a:r>
               <a:t>자체 내구성 테스트 완료, 고품질 원료 사용으로 저가 제품 대비 우수한 품질.</a:t>
             </a:r>
           </a:p>
-          <a:p>
-            <a:pPr>
-              <a:defRPr sz="1400"/>
-            </a:pPr>
-          </a:p>
-          <a:p>
-            <a:pPr>
-              <a:defRPr sz="1400"/>
+          <a:p/>
+          <a:p>
+            <a:pPr>
+              <a:defRPr sz="1300" b="1"/>
             </a:pPr>
             <a:r>
               <a:t>제품 하단 'Made by 000(근로자 실명)' 각인 서비스.</a:t>
@@ -6651,8 +6434,8 @@
         </p:nvSpPr>
         <p:spPr>
           <a:xfrm>
-            <a:off x="457200" y="274320"/>
-            <a:ext cx="8229600" cy="548640"/>
+            <a:off x="457200" y="365760"/>
+            <a:ext cx="8229600" cy="457200"/>
           </a:xfrm>
           <a:prstGeom prst="rect">
             <a:avLst/>
@@ -6660,13 +6443,13 @@
           <a:noFill/>
         </p:spPr>
         <p:txBody>
-          <a:bodyPr wrap="none">
+          <a:bodyPr wrap="square">
             <a:spAutoFit/>
           </a:bodyPr>
           <a:lstStyle/>
           <a:p>
             <a:pPr>
-              <a:defRPr sz="2800" b="1">
+              <a:defRPr sz="2600" b="1">
                 <a:solidFill>
                   <a:srgbClr val="0F172A"/>
                 </a:solidFill>
@@ -6678,18 +6461,18 @@
           </a:p>
         </p:txBody>
       </p:sp>
-      <p:sp>
-        <p:nvSpPr>
-          <p:cNvPr id="3" name="Rectangle 2"/>
-          <p:cNvSpPr/>
+      <p:cxnSp>
+        <p:nvCxnSpPr>
+          <p:cNvPr id="3" name="Connector 2"/>
+          <p:cNvCxnSpPr/>
           <p:nvPr/>
-        </p:nvSpPr>
-        <p:spPr>
-          <a:xfrm>
-            <a:off x="457200" y="868680"/>
+        </p:nvCxnSpPr>
+        <p:spPr>
+          <a:xfrm>
+            <a:off x="457200" y="914400"/>
             <a:ext cx="8229600" cy="0"/>
           </a:xfrm>
-          <a:prstGeom prst="rect">
+          <a:prstGeom prst="line">
             <a:avLst/>
           </a:prstGeom>
           <a:ln w="50800">
@@ -6699,27 +6482,20 @@
           </a:ln>
         </p:spPr>
         <p:style>
-          <a:lnRef idx="1">
+          <a:lnRef idx="2">
             <a:schemeClr val="accent1"/>
           </a:lnRef>
-          <a:fillRef idx="3">
+          <a:fillRef idx="0">
             <a:schemeClr val="accent1"/>
           </a:fillRef>
-          <a:effectRef idx="2">
+          <a:effectRef idx="1">
             <a:schemeClr val="accent1"/>
           </a:effectRef>
           <a:fontRef idx="minor">
-            <a:schemeClr val="lt1"/>
+            <a:schemeClr val="tx1"/>
           </a:fontRef>
         </p:style>
-        <p:txBody>
-          <a:bodyPr rtlCol="0" anchor="ctr"/>
-          <a:lstStyle/>
-          <a:p>
-            <a:pPr algn="ctr"/>
-          </a:p>
-        </p:txBody>
-      </p:sp>
+      </p:cxnSp>
       <p:sp>
         <p:nvSpPr>
           <p:cNvPr id="4" name="TextBox 3"/>
@@ -6728,8 +6504,8 @@
         </p:nvSpPr>
         <p:spPr>
           <a:xfrm>
-            <a:off x="914400" y="1828800"/>
-            <a:ext cx="3200400" cy="1828800"/>
+            <a:off x="731520" y="1645920"/>
+            <a:ext cx="3657600" cy="1828800"/>
           </a:xfrm>
           <a:prstGeom prst="rect">
             <a:avLst/>
@@ -6743,7 +6519,7 @@
           <a:lstStyle/>
           <a:p>
             <a:pPr>
-              <a:defRPr sz="1600" b="1">
+              <a:defRPr sz="1500" b="1">
                 <a:solidFill>
                   <a:srgbClr val="3B82F6"/>
                 </a:solidFill>
@@ -6753,30 +6529,26 @@
               <a:t>Strength (강점)</a:t>
             </a:r>
           </a:p>
-          <a:p>
-            <a:pPr>
-              <a:defRPr sz="1300"/>
-            </a:pPr>
-          </a:p>
-          <a:p>
-            <a:pPr>
-              <a:defRPr sz="1300"/>
-            </a:pPr>
-            <a:r>
-              <a:t>• 복지 전문가+기술 전문가 시너지</a:t>
-            </a:r>
-          </a:p>
-          <a:p>
-            <a:pPr>
-              <a:defRPr sz="1300"/>
-            </a:pPr>
-            <a:r>
-              <a:t>• 정부 인건비 지원 (가격 경쟁력)</a:t>
-            </a:r>
-          </a:p>
-          <a:p>
-            <a:pPr>
-              <a:defRPr sz="1300"/>
+          <a:p/>
+          <a:p>
+            <a:pPr>
+              <a:defRPr sz="1200"/>
+            </a:pPr>
+            <a:r>
+              <a:t>• 복지 전문가(대표) + 기술 전문가(공장장) 시너지</a:t>
+            </a:r>
+          </a:p>
+          <a:p>
+            <a:pPr>
+              <a:defRPr sz="1200"/>
+            </a:pPr>
+            <a:r>
+              <a:t>• 정부 인건비 지원 수혜 (가격 경쟁력 확보)</a:t>
+            </a:r>
+          </a:p>
+          <a:p>
+            <a:pPr>
+              <a:defRPr sz="1200"/>
             </a:pPr>
             <a:r>
               <a:t>• 독창적인 금형 디자인 보유</a:t>
@@ -6792,8 +6564,8 @@
         </p:nvSpPr>
         <p:spPr>
           <a:xfrm>
-            <a:off x="5029200" y="1828800"/>
-            <a:ext cx="3200400" cy="1828800"/>
+            <a:off x="4754880" y="1645920"/>
+            <a:ext cx="3657600" cy="1828800"/>
           </a:xfrm>
           <a:prstGeom prst="rect">
             <a:avLst/>
@@ -6807,7 +6579,7 @@
           <a:lstStyle/>
           <a:p>
             <a:pPr>
-              <a:defRPr sz="1600" b="1">
+              <a:defRPr sz="1500" b="1">
                 <a:solidFill>
                   <a:srgbClr val="EF4444"/>
                 </a:solidFill>
@@ -6817,14 +6589,10 @@
               <a:t>Weakness (약점)</a:t>
             </a:r>
           </a:p>
-          <a:p>
-            <a:pPr>
-              <a:defRPr sz="1300"/>
-            </a:pPr>
-          </a:p>
-          <a:p>
-            <a:pPr>
-              <a:defRPr sz="1300"/>
+          <a:p/>
+          <a:p>
+            <a:pPr>
+              <a:defRPr sz="1200"/>
             </a:pPr>
             <a:r>
               <a:t>• 초기 브랜드 인지도 부족</a:t>
@@ -6832,10 +6600,10 @@
           </a:p>
           <a:p>
             <a:pPr>
-              <a:defRPr sz="1300"/>
-            </a:pPr>
-            <a:r>
-              <a:t>• 전용 설비 초기 투자비용 부담</a:t>
+              <a:defRPr sz="1200"/>
+            </a:pPr>
+            <a:r>
+              <a:t>• 전용 설비(사출기) 구축 초기 투자비용 부담</a:t>
             </a:r>
           </a:p>
         </p:txBody>
@@ -6848,8 +6616,8 @@
         </p:nvSpPr>
         <p:spPr>
           <a:xfrm>
-            <a:off x="914400" y="4114800"/>
-            <a:ext cx="3200400" cy="1828800"/>
+            <a:off x="731520" y="3840480"/>
+            <a:ext cx="3657600" cy="1828800"/>
           </a:xfrm>
           <a:prstGeom prst="rect">
             <a:avLst/>
@@ -6863,7 +6631,7 @@
           <a:lstStyle/>
           <a:p>
             <a:pPr>
-              <a:defRPr sz="1600" b="1">
+              <a:defRPr sz="1500" b="1">
                 <a:solidFill>
                   <a:srgbClr val="10B981"/>
                 </a:solidFill>
@@ -6873,30 +6641,26 @@
               <a:t>Opportunity (기회)</a:t>
             </a:r>
           </a:p>
-          <a:p>
-            <a:pPr>
-              <a:defRPr sz="1300"/>
-            </a:pPr>
-          </a:p>
-          <a:p>
-            <a:pPr>
-              <a:defRPr sz="1300"/>
-            </a:pPr>
-            <a:r>
-              <a:t>• 공공기관 우선구매 시장(20조원)</a:t>
-            </a:r>
-          </a:p>
-          <a:p>
-            <a:pPr>
-              <a:defRPr sz="1300"/>
-            </a:pPr>
-            <a:r>
-              <a:t>• 기업 ESG 경영 강화</a:t>
-            </a:r>
-          </a:p>
-          <a:p>
-            <a:pPr>
-              <a:defRPr sz="1300"/>
+          <a:p/>
+          <a:p>
+            <a:pPr>
+              <a:defRPr sz="1200"/>
+            </a:pPr>
+            <a:r>
+              <a:t>• 공공기관 우선구매 시장(20조원) 확대</a:t>
+            </a:r>
+          </a:p>
+          <a:p>
+            <a:pPr>
+              <a:defRPr sz="1200"/>
+            </a:pPr>
+            <a:r>
+              <a:t>• 기업 ESG 경영 강화로 친환경 굿즈 수요 폭증</a:t>
+            </a:r>
+          </a:p>
+          <a:p>
+            <a:pPr>
+              <a:defRPr sz="1200"/>
             </a:pPr>
             <a:r>
               <a:t>• 가치소비 트렌드 확산</a:t>
@@ -6912,8 +6676,8 @@
         </p:nvSpPr>
         <p:spPr>
           <a:xfrm>
-            <a:off x="5029200" y="4114800"/>
-            <a:ext cx="3200400" cy="1828800"/>
+            <a:off x="4754880" y="3840480"/>
+            <a:ext cx="3657600" cy="1828800"/>
           </a:xfrm>
           <a:prstGeom prst="rect">
             <a:avLst/>
@@ -6927,7 +6691,7 @@
           <a:lstStyle/>
           <a:p>
             <a:pPr>
-              <a:defRPr sz="1600" b="1">
+              <a:defRPr sz="1500" b="1">
                 <a:solidFill>
                   <a:srgbClr val="F59E0B"/>
                 </a:solidFill>
@@ -6937,25 +6701,21 @@
               <a:t>Threat (위협)</a:t>
             </a:r>
           </a:p>
-          <a:p>
-            <a:pPr>
-              <a:defRPr sz="1300"/>
-            </a:pPr>
-          </a:p>
-          <a:p>
-            <a:pPr>
-              <a:defRPr sz="1300"/>
-            </a:pPr>
-            <a:r>
-              <a:t>• 저가 중국산 제품 경쟁</a:t>
-            </a:r>
-          </a:p>
-          <a:p>
-            <a:pPr>
-              <a:defRPr sz="1300"/>
-            </a:pPr>
-            <a:r>
-              <a:t>• 유사 업사이클링 업체 난립</a:t>
+          <a:p/>
+          <a:p>
+            <a:pPr>
+              <a:defRPr sz="1200"/>
+            </a:pPr>
+            <a:r>
+              <a:t>• 저가 중국산 제품과의 가격 경쟁</a:t>
+            </a:r>
+          </a:p>
+          <a:p>
+            <a:pPr>
+              <a:defRPr sz="1200"/>
+            </a:pPr>
+            <a:r>
+              <a:t>• 유사 업사이클링 업체의 난립</a:t>
             </a:r>
           </a:p>
         </p:txBody>
@@ -6986,8 +6746,8 @@
         </p:nvSpPr>
         <p:spPr>
           <a:xfrm>
-            <a:off x="457200" y="274320"/>
-            <a:ext cx="8229600" cy="548640"/>
+            <a:off x="457200" y="365760"/>
+            <a:ext cx="8229600" cy="457200"/>
           </a:xfrm>
           <a:prstGeom prst="rect">
             <a:avLst/>
@@ -6995,13 +6755,13 @@
           <a:noFill/>
         </p:spPr>
         <p:txBody>
-          <a:bodyPr wrap="none">
+          <a:bodyPr wrap="square">
             <a:spAutoFit/>
           </a:bodyPr>
           <a:lstStyle/>
           <a:p>
             <a:pPr>
-              <a:defRPr sz="2800" b="1">
+              <a:defRPr sz="2600" b="1">
                 <a:solidFill>
                   <a:srgbClr val="0F172A"/>
                 </a:solidFill>
@@ -7013,18 +6773,18 @@
           </a:p>
         </p:txBody>
       </p:sp>
-      <p:sp>
-        <p:nvSpPr>
-          <p:cNvPr id="3" name="Rectangle 2"/>
-          <p:cNvSpPr/>
+      <p:cxnSp>
+        <p:nvCxnSpPr>
+          <p:cNvPr id="3" name="Connector 2"/>
+          <p:cNvCxnSpPr/>
           <p:nvPr/>
-        </p:nvSpPr>
-        <p:spPr>
-          <a:xfrm>
-            <a:off x="457200" y="868680"/>
+        </p:nvCxnSpPr>
+        <p:spPr>
+          <a:xfrm>
+            <a:off x="457200" y="914400"/>
             <a:ext cx="8229600" cy="0"/>
           </a:xfrm>
-          <a:prstGeom prst="rect">
+          <a:prstGeom prst="line">
             <a:avLst/>
           </a:prstGeom>
           <a:ln w="50800">
@@ -7034,27 +6794,20 @@
           </a:ln>
         </p:spPr>
         <p:style>
-          <a:lnRef idx="1">
+          <a:lnRef idx="2">
             <a:schemeClr val="accent1"/>
           </a:lnRef>
-          <a:fillRef idx="3">
+          <a:fillRef idx="0">
             <a:schemeClr val="accent1"/>
           </a:fillRef>
-          <a:effectRef idx="2">
+          <a:effectRef idx="1">
             <a:schemeClr val="accent1"/>
           </a:effectRef>
           <a:fontRef idx="minor">
-            <a:schemeClr val="lt1"/>
+            <a:schemeClr val="tx1"/>
           </a:fontRef>
         </p:style>
-        <p:txBody>
-          <a:bodyPr rtlCol="0" anchor="ctr"/>
-          <a:lstStyle/>
-          <a:p>
-            <a:pPr algn="ctr"/>
-          </a:p>
-        </p:txBody>
-      </p:sp>
+      </p:cxnSp>
       <p:sp>
         <p:nvSpPr>
           <p:cNvPr id="4" name="TextBox 3"/>
@@ -7064,7 +6817,7 @@
         <p:spPr>
           <a:xfrm>
             <a:off x="914400" y="1645920"/>
-            <a:ext cx="3657600" cy="2743200"/>
+            <a:ext cx="3657600" cy="3200400"/>
           </a:xfrm>
           <a:prstGeom prst="rect">
             <a:avLst/>
@@ -7078,7 +6831,7 @@
           <a:lstStyle/>
           <a:p>
             <a:pPr>
-              <a:defRPr sz="1800" b="1"/>
+              <a:defRPr sz="1600" b="1"/>
             </a:pPr>
             <a:r>
               <a:t>홍보 전략</a:t>
@@ -7086,31 +6839,27 @@
           </a:p>
           <a:p>
             <a:pPr>
-              <a:defRPr sz="1400"/>
+              <a:defRPr sz="1400" b="1"/>
             </a:pPr>
             <a:r>
               <a:t>"제품이 아닌 가치를 팝니다"</a:t>
             </a:r>
           </a:p>
-          <a:p>
-            <a:pPr>
-              <a:defRPr sz="1400"/>
-            </a:pPr>
-          </a:p>
-          <a:p>
-            <a:pPr>
-              <a:defRPr sz="1400"/>
-            </a:pPr>
-            <a:r>
-              <a:t>• 스토리텔링: 제품 QR코드로 제작자의 작업 영상 연결</a:t>
-            </a:r>
-          </a:p>
-          <a:p>
-            <a:pPr>
-              <a:defRPr sz="1400"/>
-            </a:pPr>
-            <a:r>
-              <a:t>• 체험단 운영: 지역 맘카페 연계 '나만의 화분 만들기'</a:t>
+          <a:p/>
+          <a:p>
+            <a:pPr>
+              <a:defRPr sz="1200"/>
+            </a:pPr>
+            <a:r>
+              <a:t>• 스토리텔링: 제품 QR코드로 제작자(장애인)의 작업 영상 연결.</a:t>
+            </a:r>
+          </a:p>
+          <a:p>
+            <a:pPr>
+              <a:defRPr sz="1200"/>
+            </a:pPr>
+            <a:r>
+              <a:t>• 체험단 운영: 지역 맘카페 연계 '나만의 화분 만들기' 체험단.</a:t>
             </a:r>
           </a:p>
         </p:txBody>
@@ -7123,8 +6872,8 @@
         </p:nvSpPr>
         <p:spPr>
           <a:xfrm>
-            <a:off x="5029200" y="1645920"/>
-            <a:ext cx="3657600" cy="3657600"/>
+            <a:off x="4754880" y="1645920"/>
+            <a:ext cx="3657600" cy="4114800"/>
           </a:xfrm>
           <a:prstGeom prst="rect">
             <a:avLst/>
@@ -7138,62 +6887,46 @@
           <a:lstStyle/>
           <a:p>
             <a:pPr>
-              <a:defRPr sz="1800" b="1"/>
+              <a:defRPr sz="1600" b="1"/>
             </a:pPr>
             <a:r>
               <a:t>단계별 판로 개척</a:t>
             </a:r>
           </a:p>
-          <a:p>
-            <a:pPr>
-              <a:defRPr sz="1300"/>
-            </a:pPr>
-          </a:p>
-          <a:p>
-            <a:pPr>
-              <a:defRPr sz="1300"/>
-            </a:pPr>
-            <a:r>
-              <a:t>1단계 (공공): 나라장터, 꿈드래 쇼핑몰 입점</a:t>
-            </a:r>
-          </a:p>
-          <a:p>
-            <a:pPr>
-              <a:defRPr sz="1300"/>
-            </a:pPr>
-          </a:p>
-          <a:p>
-            <a:pPr>
-              <a:defRPr sz="1300"/>
-            </a:pPr>
-            <a:r>
-              <a:t>2단계 (온라인): 네이버 스마트스토어, 와디즈 펀딩</a:t>
-            </a:r>
-          </a:p>
-          <a:p>
-            <a:pPr>
-              <a:defRPr sz="1300"/>
-            </a:pPr>
-          </a:p>
-          <a:p>
-            <a:pPr>
-              <a:defRPr sz="1300"/>
-            </a:pPr>
-            <a:r>
-              <a:t>3단계 (제휴): 제로웨이스트 샵 20개소 입점</a:t>
-            </a:r>
-          </a:p>
-          <a:p>
-            <a:pPr>
-              <a:defRPr sz="1300"/>
-            </a:pPr>
-          </a:p>
-          <a:p>
-            <a:pPr>
-              <a:defRPr sz="1300"/>
-            </a:pPr>
-            <a:r>
-              <a:t>4단계 (수출): KOTRA 연계 해외 전시회 참가</a:t>
+          <a:p/>
+          <a:p>
+            <a:pPr>
+              <a:defRPr sz="1200"/>
+            </a:pPr>
+            <a:r>
+              <a:t>1단계 (공공): 나라장터, 꿈드래 쇼핑몰 입점.</a:t>
+            </a:r>
+          </a:p>
+          <a:p/>
+          <a:p>
+            <a:pPr>
+              <a:defRPr sz="1200"/>
+            </a:pPr>
+            <a:r>
+              <a:t>2단계 (온라인): 네이버 스마트스토어, 와디즈 펀딩.</a:t>
+            </a:r>
+          </a:p>
+          <a:p/>
+          <a:p>
+            <a:pPr>
+              <a:defRPr sz="1200"/>
+            </a:pPr>
+            <a:r>
+              <a:t>3단계 (제휴): 제로웨이스트 샵 20개소 입점.</a:t>
+            </a:r>
+          </a:p>
+          <a:p/>
+          <a:p>
+            <a:pPr>
+              <a:defRPr sz="1200"/>
+            </a:pPr>
+            <a:r>
+              <a:t>4단계 (수출): KOTRA 연계 해외 전시회 참가.</a:t>
             </a:r>
           </a:p>
         </p:txBody>
@@ -7224,8 +6957,8 @@
         </p:nvSpPr>
         <p:spPr>
           <a:xfrm>
-            <a:off x="457200" y="274320"/>
-            <a:ext cx="8229600" cy="548640"/>
+            <a:off x="457200" y="365760"/>
+            <a:ext cx="8229600" cy="457200"/>
           </a:xfrm>
           <a:prstGeom prst="rect">
             <a:avLst/>
@@ -7233,13 +6966,13 @@
           <a:noFill/>
         </p:spPr>
         <p:txBody>
-          <a:bodyPr wrap="none">
+          <a:bodyPr wrap="square">
             <a:spAutoFit/>
           </a:bodyPr>
           <a:lstStyle/>
           <a:p>
             <a:pPr>
-              <a:defRPr sz="2800" b="1">
+              <a:defRPr sz="2600" b="1">
                 <a:solidFill>
                   <a:srgbClr val="0F172A"/>
                 </a:solidFill>
@@ -7251,18 +6984,18 @@
           </a:p>
         </p:txBody>
       </p:sp>
-      <p:sp>
-        <p:nvSpPr>
-          <p:cNvPr id="3" name="Rectangle 2"/>
-          <p:cNvSpPr/>
+      <p:cxnSp>
+        <p:nvCxnSpPr>
+          <p:cNvPr id="3" name="Connector 2"/>
+          <p:cNvCxnSpPr/>
           <p:nvPr/>
-        </p:nvSpPr>
-        <p:spPr>
-          <a:xfrm>
-            <a:off x="457200" y="868680"/>
+        </p:nvCxnSpPr>
+        <p:spPr>
+          <a:xfrm>
+            <a:off x="457200" y="914400"/>
             <a:ext cx="8229600" cy="0"/>
           </a:xfrm>
-          <a:prstGeom prst="rect">
+          <a:prstGeom prst="line">
             <a:avLst/>
           </a:prstGeom>
           <a:ln w="50800">
@@ -7272,27 +7005,20 @@
           </a:ln>
         </p:spPr>
         <p:style>
-          <a:lnRef idx="1">
+          <a:lnRef idx="2">
             <a:schemeClr val="accent1"/>
           </a:lnRef>
-          <a:fillRef idx="3">
+          <a:fillRef idx="0">
             <a:schemeClr val="accent1"/>
           </a:fillRef>
-          <a:effectRef idx="2">
+          <a:effectRef idx="1">
             <a:schemeClr val="accent1"/>
           </a:effectRef>
           <a:fontRef idx="minor">
-            <a:schemeClr val="lt1"/>
+            <a:schemeClr val="tx1"/>
           </a:fontRef>
         </p:style>
-        <p:txBody>
-          <a:bodyPr rtlCol="0" anchor="ctr"/>
-          <a:lstStyle/>
-          <a:p>
-            <a:pPr algn="ctr"/>
-          </a:p>
-        </p:txBody>
-      </p:sp>
+      </p:cxnSp>
       <p:sp>
         <p:nvSpPr>
           <p:cNvPr id="4" name="TextBox 3"/>
@@ -7302,7 +7028,7 @@
         <p:spPr>
           <a:xfrm>
             <a:off x="731520" y="2011680"/>
-            <a:ext cx="2560320" cy="2743200"/>
+            <a:ext cx="2468880" cy="3200400"/>
           </a:xfrm>
           <a:prstGeom prst="rect">
             <a:avLst/>
@@ -7316,36 +7042,28 @@
           <a:lstStyle/>
           <a:p>
             <a:pPr>
-              <a:defRPr sz="1500" b="1"/>
+              <a:defRPr sz="1400" b="1"/>
             </a:pPr>
             <a:r>
               <a:t>대표 민소은 (본인)</a:t>
             </a:r>
           </a:p>
-          <a:p>
-            <a:pPr>
-              <a:defRPr sz="1200"/>
-            </a:pPr>
-          </a:p>
-          <a:p>
-            <a:pPr>
-              <a:defRPr sz="1200"/>
+          <a:p/>
+          <a:p>
+            <a:pPr>
+              <a:defRPr sz="1300" b="1"/>
             </a:pPr>
             <a:r>
               <a:t>사회복지 전문가 (1급)</a:t>
             </a:r>
           </a:p>
-          <a:p>
-            <a:pPr>
-              <a:defRPr sz="1200"/>
-            </a:pPr>
-          </a:p>
-          <a:p>
-            <a:pPr>
-              <a:defRPr sz="1200"/>
-            </a:pPr>
-            <a:r>
-              <a:t>인력 관리, 지자체/관공서 영업 총괄</a:t>
+          <a:p/>
+          <a:p>
+            <a:pPr>
+              <a:defRPr sz="1100"/>
+            </a:pPr>
+            <a:r>
+              <a:t>인력 관리 및 직무 지도, 지자체/관공서 영업 총괄.</a:t>
             </a:r>
           </a:p>
         </p:txBody>
@@ -7359,7 +7077,7 @@
         <p:spPr>
           <a:xfrm>
             <a:off x="3474720" y="2011680"/>
-            <a:ext cx="2560320" cy="2743200"/>
+            <a:ext cx="2468880" cy="3200400"/>
           </a:xfrm>
           <a:prstGeom prst="rect">
             <a:avLst/>
@@ -7373,36 +7091,28 @@
           <a:lstStyle/>
           <a:p>
             <a:pPr>
-              <a:defRPr sz="1500" b="1"/>
+              <a:defRPr sz="1400" b="1"/>
             </a:pPr>
             <a:r>
               <a:t>기술 이사 (CTO)</a:t>
             </a:r>
           </a:p>
-          <a:p>
-            <a:pPr>
-              <a:defRPr sz="1200"/>
-            </a:pPr>
-          </a:p>
-          <a:p>
-            <a:pPr>
-              <a:defRPr sz="1200"/>
+          <a:p/>
+          <a:p>
+            <a:pPr>
+              <a:defRPr sz="1300" b="1"/>
             </a:pPr>
             <a:r>
               <a:t>생산 총괄 (경력 20년)</a:t>
             </a:r>
           </a:p>
-          <a:p>
-            <a:pPr>
-              <a:defRPr sz="1200"/>
-            </a:pPr>
-          </a:p>
-          <a:p>
-            <a:pPr>
-              <a:defRPr sz="1200"/>
-            </a:pPr>
-            <a:r>
-              <a:t>사출 금형 설계, 생산 라인 및 품질 관리</a:t>
+          <a:p/>
+          <a:p>
+            <a:pPr>
+              <a:defRPr sz="1100"/>
+            </a:pPr>
+            <a:r>
+              <a:t>사출 금형 설계, 공장장 출신, 생산 라인 및 품질 관리.</a:t>
             </a:r>
           </a:p>
         </p:txBody>
@@ -7416,7 +7126,7 @@
         <p:spPr>
           <a:xfrm>
             <a:off x="6217920" y="2011680"/>
-            <a:ext cx="2560320" cy="2743200"/>
+            <a:ext cx="2468880" cy="3200400"/>
           </a:xfrm>
           <a:prstGeom prst="rect">
             <a:avLst/>
@@ -7430,44 +7140,28 @@
           <a:lstStyle/>
           <a:p>
             <a:pPr>
-              <a:defRPr sz="1500" b="1"/>
+              <a:defRPr sz="1400" b="1"/>
             </a:pPr>
             <a:r>
               <a:t>현장 근로자 (3명)</a:t>
             </a:r>
           </a:p>
-          <a:p>
-            <a:pPr>
-              <a:defRPr sz="1200"/>
-            </a:pPr>
-          </a:p>
-          <a:p>
-            <a:pPr>
-              <a:defRPr sz="1200"/>
+          <a:p/>
+          <a:p>
+            <a:pPr>
+              <a:defRPr sz="1300" b="1"/>
             </a:pPr>
             <a:r>
               <a:t>취약계층 우선 채용</a:t>
             </a:r>
           </a:p>
-          <a:p>
-            <a:pPr>
-              <a:defRPr sz="1200"/>
-            </a:pPr>
-          </a:p>
-          <a:p>
-            <a:pPr>
-              <a:defRPr sz="1200"/>
-            </a:pPr>
-            <a:r>
-              <a:t>경력단절여성 및 장애인</a:t>
-            </a:r>
-          </a:p>
-          <a:p>
-            <a:pPr>
-              <a:defRPr sz="1200"/>
-            </a:pPr>
-            <a:r>
-              <a:t>사회복지관 추천 채용</a:t>
+          <a:p/>
+          <a:p>
+            <a:pPr>
+              <a:defRPr sz="1100"/>
+            </a:pPr>
+            <a:r>
+              <a:t>경력단절여성 및 장애인, 지역 사회복지관 추천 채용.</a:t>
             </a:r>
           </a:p>
         </p:txBody>
@@ -7498,8 +7192,8 @@
         </p:nvSpPr>
         <p:spPr>
           <a:xfrm>
-            <a:off x="457200" y="274320"/>
-            <a:ext cx="8229600" cy="548640"/>
+            <a:off x="457200" y="365760"/>
+            <a:ext cx="8229600" cy="457200"/>
           </a:xfrm>
           <a:prstGeom prst="rect">
             <a:avLst/>
@@ -7507,13 +7201,13 @@
           <a:noFill/>
         </p:spPr>
         <p:txBody>
-          <a:bodyPr wrap="none">
+          <a:bodyPr wrap="square">
             <a:spAutoFit/>
           </a:bodyPr>
           <a:lstStyle/>
           <a:p>
             <a:pPr>
-              <a:defRPr sz="2800" b="1">
+              <a:defRPr sz="2600" b="1">
                 <a:solidFill>
                   <a:srgbClr val="0F172A"/>
                 </a:solidFill>
@@ -7525,18 +7219,18 @@
           </a:p>
         </p:txBody>
       </p:sp>
-      <p:sp>
-        <p:nvSpPr>
-          <p:cNvPr id="3" name="Rectangle 2"/>
-          <p:cNvSpPr/>
+      <p:cxnSp>
+        <p:nvCxnSpPr>
+          <p:cNvPr id="3" name="Connector 2"/>
+          <p:cNvCxnSpPr/>
           <p:nvPr/>
-        </p:nvSpPr>
-        <p:spPr>
-          <a:xfrm>
-            <a:off x="457200" y="868680"/>
+        </p:nvCxnSpPr>
+        <p:spPr>
+          <a:xfrm>
+            <a:off x="457200" y="914400"/>
             <a:ext cx="8229600" cy="0"/>
           </a:xfrm>
-          <a:prstGeom prst="rect">
+          <a:prstGeom prst="line">
             <a:avLst/>
           </a:prstGeom>
           <a:ln w="50800">
@@ -7546,27 +7240,20 @@
           </a:ln>
         </p:spPr>
         <p:style>
-          <a:lnRef idx="1">
+          <a:lnRef idx="2">
             <a:schemeClr val="accent1"/>
           </a:lnRef>
-          <a:fillRef idx="3">
+          <a:fillRef idx="0">
             <a:schemeClr val="accent1"/>
           </a:fillRef>
-          <a:effectRef idx="2">
+          <a:effectRef idx="1">
             <a:schemeClr val="accent1"/>
           </a:effectRef>
           <a:fontRef idx="minor">
-            <a:schemeClr val="lt1"/>
+            <a:schemeClr val="tx1"/>
           </a:fontRef>
         </p:style>
-        <p:txBody>
-          <a:bodyPr rtlCol="0" anchor="ctr"/>
-          <a:lstStyle/>
-          <a:p>
-            <a:pPr algn="ctr"/>
-          </a:p>
-        </p:txBody>
-      </p:sp>
+      </p:cxnSp>
       <p:graphicFrame>
         <p:nvGraphicFramePr>
           <p:cNvPr id="4" name="Table 3"/>
@@ -7598,7 +7285,7 @@
                     <a:lstStyle/>
                     <a:p>
                       <a:pPr>
-                        <a:defRPr sz="1200" b="1"/>
+                        <a:defRPr sz="1100" b="1"/>
                       </a:pPr>
                       <a:r>
                         <a:t>구분</a:t>
@@ -7613,7 +7300,7 @@
                     <a:lstStyle/>
                     <a:p>
                       <a:pPr>
-                        <a:defRPr sz="1200" b="1"/>
+                        <a:defRPr sz="1100" b="1"/>
                       </a:pPr>
                       <a:r>
                         <a:t>대상</a:t>
@@ -7628,7 +7315,7 @@
                     <a:lstStyle/>
                     <a:p>
                       <a:pPr>
-                        <a:defRPr sz="1200" b="1"/>
+                        <a:defRPr sz="1100" b="1"/>
                       </a:pPr>
                       <a:r>
                         <a:t>월 급여 (세전)</a:t>
@@ -7643,7 +7330,7 @@
                     <a:lstStyle/>
                     <a:p>
                       <a:pPr>
-                        <a:defRPr sz="1200" b="1"/>
+                        <a:defRPr sz="1100" b="1"/>
                       </a:pPr>
                       <a:r>
                         <a:t>비고</a:t>
@@ -7660,7 +7347,7 @@
                     <a:lstStyle/>
                     <a:p>
                       <a:pPr>
-                        <a:defRPr sz="1200"/>
+                        <a:defRPr sz="1100"/>
                       </a:pPr>
                       <a:r>
                         <a:t>대표</a:t>
@@ -7675,7 +7362,7 @@
                     <a:lstStyle/>
                     <a:p>
                       <a:pPr>
-                        <a:defRPr sz="1200"/>
+                        <a:defRPr sz="1100"/>
                       </a:pPr>
                       <a:r>
                         <a:t>대표 민소은</a:t>
@@ -7690,7 +7377,7 @@
                     <a:lstStyle/>
                     <a:p>
                       <a:pPr>
-                        <a:defRPr sz="1200"/>
+                        <a:defRPr sz="1100"/>
                       </a:pPr>
                       <a:r>
                         <a:t>무급</a:t>
@@ -7705,7 +7392,7 @@
                     <a:lstStyle/>
                     <a:p>
                       <a:pPr>
-                        <a:defRPr sz="1200"/>
+                        <a:defRPr sz="1100"/>
                       </a:pPr>
                       <a:r>
                         <a:t>초기 3년간 무급 (재투자)</a:t>
@@ -7722,7 +7409,7 @@
                     <a:lstStyle/>
                     <a:p>
                       <a:pPr>
-                        <a:defRPr sz="1200"/>
+                        <a:defRPr sz="1100"/>
                       </a:pPr>
                       <a:r>
                         <a:t>관리직</a:t>
@@ -7737,7 +7424,7 @@
                     <a:lstStyle/>
                     <a:p>
                       <a:pPr>
-                        <a:defRPr sz="1200"/>
+                        <a:defRPr sz="1100"/>
                       </a:pPr>
                       <a:r>
                         <a:t>기술이사</a:t>
@@ -7752,7 +7439,7 @@
                     <a:lstStyle/>
                     <a:p>
                       <a:pPr>
-                        <a:defRPr sz="1200"/>
+                        <a:defRPr sz="1100"/>
                       </a:pPr>
                       <a:r>
                         <a:t>3,000,000원</a:t>
@@ -7767,7 +7454,7 @@
                     <a:lstStyle/>
                     <a:p>
                       <a:pPr>
-                        <a:defRPr sz="1200"/>
+                        <a:defRPr sz="1100"/>
                       </a:pPr>
                       <a:r>
                         <a:t>경력직 대우</a:t>
@@ -7784,7 +7471,7 @@
                     <a:lstStyle/>
                     <a:p>
                       <a:pPr>
-                        <a:defRPr sz="1200"/>
+                        <a:defRPr sz="1100"/>
                       </a:pPr>
                       <a:r>
                         <a:t>현장직</a:t>
@@ -7799,7 +7486,7 @@
                     <a:lstStyle/>
                     <a:p>
                       <a:pPr>
-                        <a:defRPr sz="1200"/>
+                        <a:defRPr sz="1100"/>
                       </a:pPr>
                       <a:r>
                         <a:t>취약계층 근로자</a:t>
@@ -7814,7 +7501,7 @@
                     <a:lstStyle/>
                     <a:p>
                       <a:pPr>
-                        <a:defRPr sz="1200"/>
+                        <a:defRPr sz="1100"/>
                       </a:pPr>
                       <a:r>
                         <a:t>2,096,270원</a:t>
@@ -7829,7 +7516,7 @@
                     <a:lstStyle/>
                     <a:p>
                       <a:pPr>
-                        <a:defRPr sz="1200"/>
+                        <a:defRPr sz="1100"/>
                       </a:pPr>
                       <a:r>
                         <a:t>최저임금 준수</a:t>
@@ -7851,8 +7538,8 @@
         </p:nvSpPr>
         <p:spPr>
           <a:xfrm>
-            <a:off x="914400" y="4572000"/>
-            <a:ext cx="7315200" cy="1371600"/>
+            <a:off x="914400" y="4389120"/>
+            <a:ext cx="7315200" cy="1097280"/>
           </a:xfrm>
           <a:prstGeom prst="rect">
             <a:avLst/>
@@ -7866,18 +7553,18 @@
           <a:lstStyle/>
           <a:p>
             <a:pPr>
-              <a:defRPr sz="1200"/>
-            </a:pPr>
-            <a:r>
-              <a:t>※ 임금 산출 근거: 2025년 최저시급 10,030원 × 209시간</a:t>
-            </a:r>
-          </a:p>
-          <a:p>
-            <a:pPr>
-              <a:defRPr sz="1200"/>
-            </a:pPr>
-            <a:r>
-              <a:t>※ 복리후생: 4대보험 가입(두루누리), 식대 별도, 심리상담(EAP) 지원</a:t>
+              <a:defRPr sz="1100"/>
+            </a:pPr>
+            <a:r>
+              <a:t>※ 임금 산출 근거: 2025년 최저시급 10,030원 × 209시간 (주휴수당 포함 월 소정근로시간)</a:t>
+            </a:r>
+          </a:p>
+          <a:p>
+            <a:pPr>
+              <a:defRPr sz="1100"/>
+            </a:pPr>
+            <a:r>
+              <a:t>※ 복리후생: 4대보험 가입(두루누리 활용), 식대 별도 제공, 심리상담(EAP) 프로그램 지원</a:t>
             </a:r>
           </a:p>
         </p:txBody>

</xml_diff>